<commit_message>
you starte your own app
</commit_message>
<xml_diff>
--- a/Angular.pptx
+++ b/Angular.pptx
@@ -5,16 +5,18 @@
     <p:sldMasterId id="2147483668" r:id="rId1"/>
   </p:sldMasterIdLst>
   <p:notesMasterIdLst>
-    <p:notesMasterId r:id="rId9"/>
+    <p:notesMasterId r:id="rId11"/>
   </p:notesMasterIdLst>
   <p:sldIdLst>
     <p:sldId id="256" r:id="rId2"/>
     <p:sldId id="257" r:id="rId3"/>
     <p:sldId id="266" r:id="rId4"/>
     <p:sldId id="263" r:id="rId5"/>
-    <p:sldId id="264" r:id="rId6"/>
-    <p:sldId id="259" r:id="rId7"/>
-    <p:sldId id="265" r:id="rId8"/>
+    <p:sldId id="267" r:id="rId6"/>
+    <p:sldId id="268" r:id="rId7"/>
+    <p:sldId id="264" r:id="rId8"/>
+    <p:sldId id="259" r:id="rId9"/>
+    <p:sldId id="265" r:id="rId10"/>
   </p:sldIdLst>
   <p:sldSz cx="12192000" cy="6858000"/>
   <p:notesSz cx="6858000" cy="9144000"/>
@@ -122,6 +124,8 @@
             <p14:sldId id="257"/>
             <p14:sldId id="266"/>
             <p14:sldId id="263"/>
+            <p14:sldId id="267"/>
+            <p14:sldId id="268"/>
             <p14:sldId id="264"/>
             <p14:sldId id="259"/>
             <p14:sldId id="265"/>
@@ -2888,7 +2892,7 @@
           <a:p>
             <a:fld id="{22CAAE9E-66A0-400A-9BFD-27C6C5333597}" type="datetimeFigureOut">
               <a:rPr lang="de-DE" smtClean="0"/>
-              <a:t>15.09.2018</a:t>
+              <a:t>16.09.2018</a:t>
             </a:fld>
             <a:endParaRPr lang="de-DE"/>
           </a:p>
@@ -3205,8 +3209,61 @@
             </a:pPr>
             <a:r>
               <a:rPr lang="de-DE" dirty="0"/>
-              <a:t>https://angular.io/guide/styleguide#application-structure-and-ngmodules  -&gt; für die Struktur der Applikation.</a:t>
-            </a:r>
+              <a:t>Start </a:t>
+            </a:r>
+            <a:r>
+              <a:rPr lang="de-DE" dirty="0" err="1"/>
+              <a:t>java</a:t>
+            </a:r>
+            <a:r>
+              <a:rPr lang="de-DE" dirty="0"/>
+              <a:t> </a:t>
+            </a:r>
+            <a:r>
+              <a:rPr lang="de-DE" dirty="0" err="1"/>
+              <a:t>project</a:t>
+            </a:r>
+            <a:r>
+              <a:rPr lang="de-DE" dirty="0"/>
+              <a:t> </a:t>
+            </a:r>
+            <a:r>
+              <a:rPr lang="de-DE" dirty="0" err="1"/>
+              <a:t>or</a:t>
+            </a:r>
+            <a:r>
+              <a:rPr lang="de-DE" dirty="0"/>
+              <a:t> </a:t>
+            </a:r>
+            <a:r>
+              <a:rPr lang="de-DE" dirty="0" err="1"/>
+              <a:t>class</a:t>
+            </a:r>
+            <a:r>
+              <a:rPr lang="de-DE" dirty="0"/>
+              <a:t> : </a:t>
+            </a:r>
+            <a:r>
+              <a:rPr lang="de-DE" dirty="0" err="1"/>
+              <a:t>cmd</a:t>
+            </a:r>
+            <a:r>
+              <a:rPr lang="de-DE" dirty="0"/>
+              <a:t>: </a:t>
+            </a:r>
+            <a:r>
+              <a:rPr lang="de-DE" dirty="0" err="1"/>
+              <a:t>node</a:t>
+            </a:r>
+            <a:r>
+              <a:rPr lang="de-DE" dirty="0"/>
+              <a:t> </a:t>
+            </a:r>
+            <a:r>
+              <a:rPr lang="de-DE" dirty="0" err="1"/>
+              <a:t>jt.javascript</a:t>
+            </a:r>
+            <a:endParaRPr lang="de-DE" dirty="0"/>
           </a:p>
         </p:txBody>
       </p:sp>
@@ -3381,6 +3438,41 @@
           <a:bodyPr/>
           <a:lstStyle/>
           <a:p>
+            <a:r>
+              <a:rPr lang="de-DE" dirty="0"/>
+              <a:t>Normaler </a:t>
+            </a:r>
+            <a:r>
+              <a:rPr lang="de-DE" dirty="0" err="1"/>
+              <a:t>app</a:t>
+            </a:r>
+            <a:r>
+              <a:rPr lang="de-DE" dirty="0"/>
+              <a:t> haben öfter </a:t>
+            </a:r>
+            <a:r>
+              <a:rPr lang="de-DE" dirty="0" err="1"/>
+              <a:t>follenge</a:t>
+            </a:r>
+            <a:r>
+              <a:rPr lang="de-DE" dirty="0"/>
+              <a:t> </a:t>
+            </a:r>
+            <a:r>
+              <a:rPr lang="de-DE" dirty="0" err="1"/>
+              <a:t>Archichture</a:t>
+            </a:r>
+            <a:r>
+              <a:rPr lang="de-DE" dirty="0"/>
+              <a:t>: App Components !! Nicht Angular </a:t>
+            </a:r>
+            <a:r>
+              <a:rPr lang="de-DE" dirty="0" err="1"/>
+              <a:t>Component</a:t>
+            </a:r>
+            <a:endParaRPr lang="de-DE" dirty="0"/>
+          </a:p>
+          <a:p>
             <a:endParaRPr lang="de-DE" dirty="0"/>
           </a:p>
         </p:txBody>
@@ -3411,7 +3503,7 @@
     </p:spTree>
     <p:extLst>
       <p:ext uri="{BB962C8B-B14F-4D97-AF65-F5344CB8AC3E}">
-        <p14:creationId xmlns:p14="http://schemas.microsoft.com/office/powerpoint/2010/main" val="1579356702"/>
+        <p14:creationId xmlns:p14="http://schemas.microsoft.com/office/powerpoint/2010/main" val="2373534078"/>
       </p:ext>
     </p:extLst>
   </p:cSld>
@@ -3467,32 +3559,78 @@
           <a:p>
             <a:r>
               <a:rPr lang="de-DE" dirty="0"/>
-              <a:t>Ein </a:t>
+              <a:t>Module ist eine Gruppierung der Komponenten:</a:t>
+            </a:r>
+          </a:p>
+          <a:p>
+            <a:pPr marL="171450" indent="-171450">
+              <a:buFont typeface="Arial" panose="020B0604020202020204" pitchFamily="34" charset="0"/>
+              <a:buChar char="•"/>
+            </a:pPr>
+            <a:r>
+              <a:rPr lang="de-DE" dirty="0"/>
+              <a:t>Diese bietet ein clean-</a:t>
             </a:r>
             <a:r>
               <a:rPr lang="de-DE" dirty="0" err="1"/>
-              <a:t>Appl</a:t>
+              <a:t>Archictedture</a:t>
             </a:r>
             <a:r>
               <a:rPr lang="de-DE" dirty="0"/>
-              <a:t> ist eine Sammlung von </a:t>
+              <a:t> von deiner App</a:t>
+            </a:r>
+          </a:p>
+          <a:p>
+            <a:pPr marL="171450" indent="-171450">
+              <a:buFont typeface="Arial" panose="020B0604020202020204" pitchFamily="34" charset="0"/>
+              <a:buChar char="•"/>
+            </a:pPr>
+            <a:r>
+              <a:rPr lang="de-DE" dirty="0"/>
+              <a:t>Module können </a:t>
+            </a:r>
+            <a:r>
+              <a:rPr lang="de-DE" b="1" dirty="0"/>
+              <a:t>importiert</a:t>
+            </a:r>
+            <a:r>
+              <a:rPr lang="de-DE" dirty="0"/>
+              <a:t> werden</a:t>
+            </a:r>
+          </a:p>
+          <a:p>
+            <a:pPr marL="171450" indent="-171450">
+              <a:buFont typeface="Arial" panose="020B0604020202020204" pitchFamily="34" charset="0"/>
+              <a:buChar char="•"/>
+            </a:pPr>
+            <a:r>
+              <a:rPr lang="de-DE" dirty="0"/>
+              <a:t>Angular Module </a:t>
             </a:r>
             <a:r>
               <a:rPr lang="de-DE" dirty="0" err="1"/>
-              <a:t>Assemblies</a:t>
+              <a:t>class</a:t>
             </a:r>
             <a:r>
               <a:rPr lang="de-DE" dirty="0"/>
-              <a:t> , jede </a:t>
+              <a:t> haben immer sind mit </a:t>
+            </a:r>
+            <a:r>
+              <a:rPr lang="de-DE" b="1" dirty="0" err="1"/>
+              <a:t>export</a:t>
+            </a:r>
+            <a:r>
+              <a:rPr lang="de-DE" dirty="0"/>
+              <a:t> </a:t>
             </a:r>
             <a:r>
               <a:rPr lang="de-DE" dirty="0" err="1"/>
-              <a:t>Assemblies</a:t>
-            </a:r>
-            <a:r>
-              <a:rPr lang="de-DE" dirty="0"/>
-              <a:t> liefert spezifische Aufgaben, physikalische das ist ein Datei in der Disk.</a:t>
-            </a:r>
+              <a:t>gekennzeichen</a:t>
+            </a:r>
+            <a:endParaRPr lang="de-DE" dirty="0"/>
+          </a:p>
+          <a:p>
+            <a:endParaRPr lang="de-DE" dirty="0"/>
           </a:p>
         </p:txBody>
       </p:sp>
@@ -3522,7 +3660,7 @@
     </p:spTree>
     <p:extLst>
       <p:ext uri="{BB962C8B-B14F-4D97-AF65-F5344CB8AC3E}">
-        <p14:creationId xmlns:p14="http://schemas.microsoft.com/office/powerpoint/2010/main" val="1935228195"/>
+        <p14:creationId xmlns:p14="http://schemas.microsoft.com/office/powerpoint/2010/main" val="2155203927"/>
       </p:ext>
     </p:extLst>
   </p:cSld>
@@ -3576,6 +3714,201 @@
           <a:bodyPr/>
           <a:lstStyle/>
           <a:p>
+            <a:endParaRPr lang="de-DE" dirty="0"/>
+          </a:p>
+        </p:txBody>
+      </p:sp>
+      <p:sp>
+        <p:nvSpPr>
+          <p:cNvPr id="4" name="Foliennummernplatzhalter 3"/>
+          <p:cNvSpPr>
+            <a:spLocks noGrp="1"/>
+          </p:cNvSpPr>
+          <p:nvPr>
+            <p:ph type="sldNum" sz="quarter" idx="10"/>
+          </p:nvPr>
+        </p:nvSpPr>
+        <p:spPr/>
+        <p:txBody>
+          <a:bodyPr/>
+          <a:lstStyle/>
+          <a:p>
+            <a:fld id="{9F0F13B5-A42A-4AB5-B7EE-E7F36F37EF43}" type="slidenum">
+              <a:rPr lang="de-DE" smtClean="0"/>
+              <a:t>7</a:t>
+            </a:fld>
+            <a:endParaRPr lang="de-DE"/>
+          </a:p>
+        </p:txBody>
+      </p:sp>
+    </p:spTree>
+    <p:extLst>
+      <p:ext uri="{BB962C8B-B14F-4D97-AF65-F5344CB8AC3E}">
+        <p14:creationId xmlns:p14="http://schemas.microsoft.com/office/powerpoint/2010/main" val="1579356702"/>
+      </p:ext>
+    </p:extLst>
+  </p:cSld>
+  <p:clrMapOvr>
+    <a:masterClrMapping/>
+  </p:clrMapOvr>
+</p:notes>
+</file>
+
+<file path=ppt/notesSlides/notesSlide6.xml><?xml version="1.0" encoding="utf-8"?>
+<p:notes xmlns:a="http://schemas.openxmlformats.org/drawingml/2006/main" xmlns:r="http://schemas.openxmlformats.org/officeDocument/2006/relationships" xmlns:p="http://schemas.openxmlformats.org/presentationml/2006/main">
+  <p:cSld>
+    <p:spTree>
+      <p:nvGrpSpPr>
+        <p:cNvPr id="1" name=""/>
+        <p:cNvGrpSpPr/>
+        <p:nvPr/>
+      </p:nvGrpSpPr>
+      <p:grpSpPr>
+        <a:xfrm>
+          <a:off x="0" y="0"/>
+          <a:ext cx="0" cy="0"/>
+          <a:chOff x="0" y="0"/>
+          <a:chExt cx="0" cy="0"/>
+        </a:xfrm>
+      </p:grpSpPr>
+      <p:sp>
+        <p:nvSpPr>
+          <p:cNvPr id="2" name="Folienbildplatzhalter 1"/>
+          <p:cNvSpPr>
+            <a:spLocks noGrp="1" noRot="1" noChangeAspect="1"/>
+          </p:cNvSpPr>
+          <p:nvPr>
+            <p:ph type="sldImg"/>
+          </p:nvPr>
+        </p:nvSpPr>
+        <p:spPr/>
+      </p:sp>
+      <p:sp>
+        <p:nvSpPr>
+          <p:cNvPr id="3" name="Notizenplatzhalter 2"/>
+          <p:cNvSpPr>
+            <a:spLocks noGrp="1"/>
+          </p:cNvSpPr>
+          <p:nvPr>
+            <p:ph type="body" idx="1"/>
+          </p:nvPr>
+        </p:nvSpPr>
+        <p:spPr/>
+        <p:txBody>
+          <a:bodyPr/>
+          <a:lstStyle/>
+          <a:p>
+            <a:r>
+              <a:rPr lang="de-DE" dirty="0"/>
+              <a:t>Ein </a:t>
+            </a:r>
+            <a:r>
+              <a:rPr lang="de-DE" dirty="0" err="1"/>
+              <a:t>Appl</a:t>
+            </a:r>
+            <a:r>
+              <a:rPr lang="de-DE" dirty="0"/>
+              <a:t> ist eine Sammlung von </a:t>
+            </a:r>
+            <a:r>
+              <a:rPr lang="de-DE" dirty="0" err="1"/>
+              <a:t>Assemblies</a:t>
+            </a:r>
+            <a:r>
+              <a:rPr lang="de-DE" dirty="0"/>
+              <a:t> , jede </a:t>
+            </a:r>
+            <a:r>
+              <a:rPr lang="de-DE" dirty="0" err="1"/>
+              <a:t>Assemblies</a:t>
+            </a:r>
+            <a:r>
+              <a:rPr lang="de-DE" dirty="0"/>
+              <a:t> liefert spezifische Aufgaben, physikalische das ist ein Datei in der Disk.</a:t>
+            </a:r>
+          </a:p>
+        </p:txBody>
+      </p:sp>
+      <p:sp>
+        <p:nvSpPr>
+          <p:cNvPr id="4" name="Foliennummernplatzhalter 3"/>
+          <p:cNvSpPr>
+            <a:spLocks noGrp="1"/>
+          </p:cNvSpPr>
+          <p:nvPr>
+            <p:ph type="sldNum" sz="quarter" idx="10"/>
+          </p:nvPr>
+        </p:nvSpPr>
+        <p:spPr/>
+        <p:txBody>
+          <a:bodyPr/>
+          <a:lstStyle/>
+          <a:p>
+            <a:fld id="{9F0F13B5-A42A-4AB5-B7EE-E7F36F37EF43}" type="slidenum">
+              <a:rPr lang="de-DE" smtClean="0"/>
+              <a:t>8</a:t>
+            </a:fld>
+            <a:endParaRPr lang="de-DE"/>
+          </a:p>
+        </p:txBody>
+      </p:sp>
+    </p:spTree>
+    <p:extLst>
+      <p:ext uri="{BB962C8B-B14F-4D97-AF65-F5344CB8AC3E}">
+        <p14:creationId xmlns:p14="http://schemas.microsoft.com/office/powerpoint/2010/main" val="1935228195"/>
+      </p:ext>
+    </p:extLst>
+  </p:cSld>
+  <p:clrMapOvr>
+    <a:masterClrMapping/>
+  </p:clrMapOvr>
+</p:notes>
+</file>
+
+<file path=ppt/notesSlides/notesSlide7.xml><?xml version="1.0" encoding="utf-8"?>
+<p:notes xmlns:a="http://schemas.openxmlformats.org/drawingml/2006/main" xmlns:r="http://schemas.openxmlformats.org/officeDocument/2006/relationships" xmlns:p="http://schemas.openxmlformats.org/presentationml/2006/main">
+  <p:cSld>
+    <p:spTree>
+      <p:nvGrpSpPr>
+        <p:cNvPr id="1" name=""/>
+        <p:cNvGrpSpPr/>
+        <p:nvPr/>
+      </p:nvGrpSpPr>
+      <p:grpSpPr>
+        <a:xfrm>
+          <a:off x="0" y="0"/>
+          <a:ext cx="0" cy="0"/>
+          <a:chOff x="0" y="0"/>
+          <a:chExt cx="0" cy="0"/>
+        </a:xfrm>
+      </p:grpSpPr>
+      <p:sp>
+        <p:nvSpPr>
+          <p:cNvPr id="2" name="Folienbildplatzhalter 1"/>
+          <p:cNvSpPr>
+            <a:spLocks noGrp="1" noRot="1" noChangeAspect="1"/>
+          </p:cNvSpPr>
+          <p:nvPr>
+            <p:ph type="sldImg"/>
+          </p:nvPr>
+        </p:nvSpPr>
+        <p:spPr/>
+      </p:sp>
+      <p:sp>
+        <p:nvSpPr>
+          <p:cNvPr id="3" name="Notizenplatzhalter 2"/>
+          <p:cNvSpPr>
+            <a:spLocks noGrp="1"/>
+          </p:cNvSpPr>
+          <p:nvPr>
+            <p:ph type="body" idx="1"/>
+          </p:nvPr>
+        </p:nvSpPr>
+        <p:spPr/>
+        <p:txBody>
+          <a:bodyPr/>
+          <a:lstStyle/>
+          <a:p>
             <a:pPr marL="228600" indent="-228600">
               <a:buFont typeface="+mj-lt"/>
               <a:buAutoNum type="arabicPeriod"/>
@@ -3656,7 +3989,7 @@
           <a:p>
             <a:fld id="{9F0F13B5-A42A-4AB5-B7EE-E7F36F37EF43}" type="slidenum">
               <a:rPr lang="de-DE" smtClean="0"/>
-              <a:t>7</a:t>
+              <a:t>9</a:t>
             </a:fld>
             <a:endParaRPr lang="de-DE"/>
           </a:p>
@@ -3864,7 +4197,7 @@
             <a:fld id="{B61BEF0D-F0BB-DE4B-95CE-6DB70DBA9567}" type="datetimeFigureOut">
               <a:rPr lang="en-US" smtClean="0"/>
               <a:pPr/>
-              <a:t>9/15/2018</a:t>
+              <a:t>9/16/2018</a:t>
             </a:fld>
             <a:endParaRPr lang="en-US" dirty="0"/>
           </a:p>
@@ -4204,7 +4537,7 @@
             <a:fld id="{B61BEF0D-F0BB-DE4B-95CE-6DB70DBA9567}" type="datetimeFigureOut">
               <a:rPr lang="en-US" smtClean="0"/>
               <a:pPr/>
-              <a:t>9/15/2018</a:t>
+              <a:t>9/16/2018</a:t>
             </a:fld>
             <a:endParaRPr lang="en-US" dirty="0"/>
           </a:p>
@@ -4607,7 +4940,7 @@
             <a:fld id="{B61BEF0D-F0BB-DE4B-95CE-6DB70DBA9567}" type="datetimeFigureOut">
               <a:rPr lang="en-US" smtClean="0"/>
               <a:pPr/>
-              <a:t>9/15/2018</a:t>
+              <a:t>9/16/2018</a:t>
             </a:fld>
             <a:endParaRPr lang="en-US" dirty="0"/>
           </a:p>
@@ -4945,7 +5278,7 @@
             <a:fld id="{B61BEF0D-F0BB-DE4B-95CE-6DB70DBA9567}" type="datetimeFigureOut">
               <a:rPr lang="en-US" smtClean="0"/>
               <a:pPr/>
-              <a:t>9/15/2018</a:t>
+              <a:t>9/16/2018</a:t>
             </a:fld>
             <a:endParaRPr lang="en-US" dirty="0"/>
           </a:p>
@@ -5267,7 +5600,7 @@
             <a:fld id="{B61BEF0D-F0BB-DE4B-95CE-6DB70DBA9567}" type="datetimeFigureOut">
               <a:rPr lang="en-US" smtClean="0"/>
               <a:pPr/>
-              <a:t>9/15/2018</a:t>
+              <a:t>9/16/2018</a:t>
             </a:fld>
             <a:endParaRPr lang="en-US" dirty="0"/>
           </a:p>
@@ -5665,7 +5998,7 @@
             <a:fld id="{B61BEF0D-F0BB-DE4B-95CE-6DB70DBA9567}" type="datetimeFigureOut">
               <a:rPr lang="en-US" smtClean="0"/>
               <a:pPr/>
-              <a:t>9/15/2018</a:t>
+              <a:t>9/16/2018</a:t>
             </a:fld>
             <a:endParaRPr lang="en-US" dirty="0"/>
           </a:p>
@@ -5923,7 +6256,7 @@
           <a:p>
             <a:fld id="{55C6B4A9-1611-4792-9094-5F34BCA07E0B}" type="datetimeFigureOut">
               <a:rPr lang="en-US" smtClean="0"/>
-              <a:t>9/15/2018</a:t>
+              <a:t>9/16/2018</a:t>
             </a:fld>
             <a:endParaRPr lang="en-US" dirty="0"/>
           </a:p>
@@ -6186,7 +6519,7 @@
             <a:fld id="{B61BEF0D-F0BB-DE4B-95CE-6DB70DBA9567}" type="datetimeFigureOut">
               <a:rPr lang="en-US" smtClean="0"/>
               <a:pPr/>
-              <a:t>9/15/2018</a:t>
+              <a:t>9/16/2018</a:t>
             </a:fld>
             <a:endParaRPr lang="en-US" dirty="0"/>
           </a:p>
@@ -6450,7 +6783,7 @@
             <a:fld id="{B61BEF0D-F0BB-DE4B-95CE-6DB70DBA9567}" type="datetimeFigureOut">
               <a:rPr lang="en-US" smtClean="0"/>
               <a:pPr/>
-              <a:t>9/15/2018</a:t>
+              <a:t>9/16/2018</a:t>
             </a:fld>
             <a:endParaRPr lang="en-US" dirty="0"/>
           </a:p>
@@ -6781,7 +7114,7 @@
             <a:fld id="{B61BEF0D-F0BB-DE4B-95CE-6DB70DBA9567}" type="datetimeFigureOut">
               <a:rPr lang="en-US" smtClean="0"/>
               <a:pPr/>
-              <a:t>9/15/2018</a:t>
+              <a:t>9/16/2018</a:t>
             </a:fld>
             <a:endParaRPr lang="en-US" dirty="0"/>
           </a:p>
@@ -7105,7 +7438,7 @@
           <a:p>
             <a:fld id="{EB712588-04B1-427B-82EE-E8DB90309F08}" type="datetimeFigureOut">
               <a:rPr lang="en-US" smtClean="0"/>
-              <a:t>9/15/2018</a:t>
+              <a:t>9/16/2018</a:t>
             </a:fld>
             <a:endParaRPr lang="en-US" dirty="0"/>
           </a:p>
@@ -7563,7 +7896,7 @@
             <a:fld id="{B61BEF0D-F0BB-DE4B-95CE-6DB70DBA9567}" type="datetimeFigureOut">
               <a:rPr lang="en-US" smtClean="0"/>
               <a:pPr/>
-              <a:t>9/15/2018</a:t>
+              <a:t>9/16/2018</a:t>
             </a:fld>
             <a:endParaRPr lang="en-US" dirty="0"/>
           </a:p>
@@ -7770,7 +8103,7 @@
             <a:fld id="{B61BEF0D-F0BB-DE4B-95CE-6DB70DBA9567}" type="datetimeFigureOut">
               <a:rPr lang="en-US" smtClean="0"/>
               <a:pPr/>
-              <a:t>9/15/2018</a:t>
+              <a:t>9/16/2018</a:t>
             </a:fld>
             <a:endParaRPr lang="en-US" dirty="0"/>
           </a:p>
@@ -7949,7 +8282,7 @@
             <a:fld id="{B61BEF0D-F0BB-DE4B-95CE-6DB70DBA9567}" type="datetimeFigureOut">
               <a:rPr lang="en-US" smtClean="0"/>
               <a:pPr/>
-              <a:t>9/15/2018</a:t>
+              <a:t>9/16/2018</a:t>
             </a:fld>
             <a:endParaRPr lang="en-US" dirty="0"/>
           </a:p>
@@ -8283,7 +8616,7 @@
           <a:p>
             <a:fld id="{42A54C80-263E-416B-A8E0-580EDEADCBDC}" type="datetimeFigureOut">
               <a:rPr lang="en-US" smtClean="0"/>
-              <a:t>9/15/2018</a:t>
+              <a:t>9/16/2018</a:t>
             </a:fld>
             <a:endParaRPr lang="en-US" dirty="0"/>
           </a:p>
@@ -8629,7 +8962,7 @@
             <a:fld id="{B61BEF0D-F0BB-DE4B-95CE-6DB70DBA9567}" type="datetimeFigureOut">
               <a:rPr lang="en-US" smtClean="0"/>
               <a:pPr/>
-              <a:t>9/15/2018</a:t>
+              <a:t>9/16/2018</a:t>
             </a:fld>
             <a:endParaRPr lang="en-US" dirty="0"/>
           </a:p>
@@ -10748,7 +11081,7 @@
             <a:fld id="{B61BEF0D-F0BB-DE4B-95CE-6DB70DBA9567}" type="datetimeFigureOut">
               <a:rPr lang="en-US" smtClean="0"/>
               <a:pPr/>
-              <a:t>9/15/2018</a:t>
+              <a:t>9/16/2018</a:t>
             </a:fld>
             <a:endParaRPr lang="en-US" dirty="0"/>
           </a:p>
@@ -11537,7 +11870,7 @@
           <a:p>
             <a:fld id="{EA5DD505-B7AC-4543-8416-7B0192C88363}" type="datetime1">
               <a:rPr lang="en-US" smtClean="0"/>
-              <a:t>9/15/2018</a:t>
+              <a:t>9/16/2018</a:t>
             </a:fld>
             <a:endParaRPr lang="en-US" dirty="0"/>
           </a:p>
@@ -12715,7 +13048,7 @@
           <a:p>
             <a:r>
               <a:rPr lang="de-DE" dirty="0"/>
-              <a:t>Agenda</a:t>
+              <a:t>Agenda: Angular</a:t>
             </a:r>
           </a:p>
         </p:txBody>
@@ -12866,7 +13199,7 @@
           <a:p>
             <a:fld id="{EA5DD505-B7AC-4543-8416-7B0192C88363}" type="datetime1">
               <a:rPr lang="en-US" smtClean="0"/>
-              <a:t>9/15/2018</a:t>
+              <a:t>9/16/2018</a:t>
             </a:fld>
             <a:endParaRPr lang="en-US" dirty="0"/>
           </a:p>
@@ -14109,6 +14442,2012 @@
           <p:cNvPr id="2" name="Titel 1">
             <a:extLst>
               <a:ext uri="{FF2B5EF4-FFF2-40B4-BE49-F238E27FC236}">
+                <a16:creationId xmlns:a16="http://schemas.microsoft.com/office/drawing/2014/main" id="{AA694204-F6B6-4325-87C1-996265A22143}"/>
+              </a:ext>
+            </a:extLst>
+          </p:cNvPr>
+          <p:cNvSpPr>
+            <a:spLocks noGrp="1"/>
+          </p:cNvSpPr>
+          <p:nvPr>
+            <p:ph type="title"/>
+          </p:nvPr>
+        </p:nvSpPr>
+        <p:spPr/>
+        <p:txBody>
+          <a:bodyPr/>
+          <a:lstStyle/>
+          <a:p>
+            <a:r>
+              <a:rPr lang="de-DE" dirty="0"/>
+              <a:t>Components</a:t>
+            </a:r>
+          </a:p>
+        </p:txBody>
+      </p:sp>
+      <p:sp>
+        <p:nvSpPr>
+          <p:cNvPr id="4" name="Rechteck: abgerundete Ecken 3">
+            <a:extLst>
+              <a:ext uri="{FF2B5EF4-FFF2-40B4-BE49-F238E27FC236}">
+                <a16:creationId xmlns:a16="http://schemas.microsoft.com/office/drawing/2014/main" id="{C7A24D26-EC5F-4476-9AC1-AFBD44B34CB9}"/>
+              </a:ext>
+            </a:extLst>
+          </p:cNvPr>
+          <p:cNvSpPr/>
+          <p:nvPr/>
+        </p:nvSpPr>
+        <p:spPr>
+          <a:xfrm>
+            <a:off x="4949952" y="1584960"/>
+            <a:ext cx="1341120" cy="540000"/>
+          </a:xfrm>
+          <a:prstGeom prst="roundRect">
+            <a:avLst/>
+          </a:prstGeom>
+        </p:spPr>
+        <p:style>
+          <a:lnRef idx="2">
+            <a:schemeClr val="accent1">
+              <a:shade val="50000"/>
+            </a:schemeClr>
+          </a:lnRef>
+          <a:fillRef idx="1">
+            <a:schemeClr val="accent1"/>
+          </a:fillRef>
+          <a:effectRef idx="0">
+            <a:schemeClr val="accent1"/>
+          </a:effectRef>
+          <a:fontRef idx="minor">
+            <a:schemeClr val="lt1"/>
+          </a:fontRef>
+        </p:style>
+        <p:txBody>
+          <a:bodyPr rtlCol="0" anchor="ctr"/>
+          <a:lstStyle/>
+          <a:p>
+            <a:pPr algn="ctr"/>
+            <a:r>
+              <a:rPr lang="de-DE" b="1" dirty="0"/>
+              <a:t>App</a:t>
+            </a:r>
+          </a:p>
+        </p:txBody>
+      </p:sp>
+      <p:sp>
+        <p:nvSpPr>
+          <p:cNvPr id="5" name="Rechteck: abgerundete Ecken 4">
+            <a:extLst>
+              <a:ext uri="{FF2B5EF4-FFF2-40B4-BE49-F238E27FC236}">
+                <a16:creationId xmlns:a16="http://schemas.microsoft.com/office/drawing/2014/main" id="{D7336382-4C87-4F0A-9F0B-8A04FEC29448}"/>
+              </a:ext>
+            </a:extLst>
+          </p:cNvPr>
+          <p:cNvSpPr/>
+          <p:nvPr/>
+        </p:nvSpPr>
+        <p:spPr>
+          <a:xfrm>
+            <a:off x="2298192" y="3100546"/>
+            <a:ext cx="1341120" cy="540000"/>
+          </a:xfrm>
+          <a:prstGeom prst="roundRect">
+            <a:avLst/>
+          </a:prstGeom>
+          <a:solidFill>
+            <a:schemeClr val="bg2">
+              <a:lumMod val="50000"/>
+            </a:schemeClr>
+          </a:solidFill>
+        </p:spPr>
+        <p:style>
+          <a:lnRef idx="2">
+            <a:schemeClr val="accent1">
+              <a:shade val="50000"/>
+            </a:schemeClr>
+          </a:lnRef>
+          <a:fillRef idx="1">
+            <a:schemeClr val="accent1"/>
+          </a:fillRef>
+          <a:effectRef idx="0">
+            <a:schemeClr val="accent1"/>
+          </a:effectRef>
+          <a:fontRef idx="minor">
+            <a:schemeClr val="lt1"/>
+          </a:fontRef>
+        </p:style>
+        <p:txBody>
+          <a:bodyPr rtlCol="0" anchor="ctr"/>
+          <a:lstStyle/>
+          <a:p>
+            <a:pPr algn="ctr"/>
+            <a:r>
+              <a:rPr lang="de-DE" b="1" dirty="0"/>
+              <a:t>Sidebar</a:t>
+            </a:r>
+          </a:p>
+        </p:txBody>
+      </p:sp>
+      <p:sp>
+        <p:nvSpPr>
+          <p:cNvPr id="6" name="Rechteck: abgerundete Ecken 5">
+            <a:extLst>
+              <a:ext uri="{FF2B5EF4-FFF2-40B4-BE49-F238E27FC236}">
+                <a16:creationId xmlns:a16="http://schemas.microsoft.com/office/drawing/2014/main" id="{0AD6926F-A4A7-4483-A433-B3919ABD3C6F}"/>
+              </a:ext>
+            </a:extLst>
+          </p:cNvPr>
+          <p:cNvSpPr/>
+          <p:nvPr/>
+        </p:nvSpPr>
+        <p:spPr>
+          <a:xfrm>
+            <a:off x="4949952" y="3054097"/>
+            <a:ext cx="1341120" cy="540000"/>
+          </a:xfrm>
+          <a:prstGeom prst="roundRect">
+            <a:avLst/>
+          </a:prstGeom>
+          <a:solidFill>
+            <a:schemeClr val="bg2">
+              <a:lumMod val="50000"/>
+            </a:schemeClr>
+          </a:solidFill>
+        </p:spPr>
+        <p:style>
+          <a:lnRef idx="2">
+            <a:schemeClr val="accent1">
+              <a:shade val="50000"/>
+            </a:schemeClr>
+          </a:lnRef>
+          <a:fillRef idx="1">
+            <a:schemeClr val="accent1"/>
+          </a:fillRef>
+          <a:effectRef idx="0">
+            <a:schemeClr val="accent1"/>
+          </a:effectRef>
+          <a:fontRef idx="minor">
+            <a:schemeClr val="lt1"/>
+          </a:fontRef>
+        </p:style>
+        <p:txBody>
+          <a:bodyPr rtlCol="0" anchor="ctr"/>
+          <a:lstStyle/>
+          <a:p>
+            <a:pPr algn="ctr"/>
+            <a:r>
+              <a:rPr lang="de-DE" b="1" dirty="0"/>
+              <a:t>Courses</a:t>
+            </a:r>
+          </a:p>
+        </p:txBody>
+      </p:sp>
+      <p:sp>
+        <p:nvSpPr>
+          <p:cNvPr id="7" name="Rechteck: abgerundete Ecken 6">
+            <a:extLst>
+              <a:ext uri="{FF2B5EF4-FFF2-40B4-BE49-F238E27FC236}">
+                <a16:creationId xmlns:a16="http://schemas.microsoft.com/office/drawing/2014/main" id="{69412992-EBCD-4C6D-8E91-6AC65137F9DD}"/>
+              </a:ext>
+            </a:extLst>
+          </p:cNvPr>
+          <p:cNvSpPr/>
+          <p:nvPr/>
+        </p:nvSpPr>
+        <p:spPr>
+          <a:xfrm>
+            <a:off x="7601712" y="3054097"/>
+            <a:ext cx="1341120" cy="540000"/>
+          </a:xfrm>
+          <a:prstGeom prst="roundRect">
+            <a:avLst/>
+          </a:prstGeom>
+          <a:solidFill>
+            <a:schemeClr val="bg2">
+              <a:lumMod val="50000"/>
+            </a:schemeClr>
+          </a:solidFill>
+        </p:spPr>
+        <p:style>
+          <a:lnRef idx="2">
+            <a:schemeClr val="accent1">
+              <a:shade val="50000"/>
+            </a:schemeClr>
+          </a:lnRef>
+          <a:fillRef idx="1">
+            <a:schemeClr val="accent1"/>
+          </a:fillRef>
+          <a:effectRef idx="0">
+            <a:schemeClr val="accent1"/>
+          </a:effectRef>
+          <a:fontRef idx="minor">
+            <a:schemeClr val="lt1"/>
+          </a:fontRef>
+        </p:style>
+        <p:txBody>
+          <a:bodyPr rtlCol="0" anchor="ctr"/>
+          <a:lstStyle/>
+          <a:p>
+            <a:pPr algn="ctr"/>
+            <a:r>
+              <a:rPr lang="de-DE" b="1" dirty="0" err="1"/>
+              <a:t>Navbar</a:t>
+            </a:r>
+            <a:endParaRPr lang="de-DE" b="1" dirty="0"/>
+          </a:p>
+        </p:txBody>
+      </p:sp>
+      <p:cxnSp>
+        <p:nvCxnSpPr>
+          <p:cNvPr id="9" name="Gerade Verbindung mit Pfeil 8">
+            <a:extLst>
+              <a:ext uri="{FF2B5EF4-FFF2-40B4-BE49-F238E27FC236}">
+                <a16:creationId xmlns:a16="http://schemas.microsoft.com/office/drawing/2014/main" id="{27774663-4CF1-4B9B-BC88-807EDA68BE8F}"/>
+              </a:ext>
+            </a:extLst>
+          </p:cNvPr>
+          <p:cNvCxnSpPr>
+            <a:cxnSpLocks/>
+            <a:stCxn id="4" idx="2"/>
+            <a:endCxn id="6" idx="0"/>
+          </p:cNvCxnSpPr>
+          <p:nvPr/>
+        </p:nvCxnSpPr>
+        <p:spPr>
+          <a:xfrm>
+            <a:off x="5620512" y="2124960"/>
+            <a:ext cx="0" cy="929137"/>
+          </a:xfrm>
+          <a:prstGeom prst="straightConnector1">
+            <a:avLst/>
+          </a:prstGeom>
+          <a:ln w="28575">
+            <a:tailEnd type="triangle"/>
+          </a:ln>
+        </p:spPr>
+        <p:style>
+          <a:lnRef idx="1">
+            <a:schemeClr val="accent1"/>
+          </a:lnRef>
+          <a:fillRef idx="0">
+            <a:schemeClr val="accent1"/>
+          </a:fillRef>
+          <a:effectRef idx="0">
+            <a:schemeClr val="accent1"/>
+          </a:effectRef>
+          <a:fontRef idx="minor">
+            <a:schemeClr val="tx1"/>
+          </a:fontRef>
+        </p:style>
+      </p:cxnSp>
+      <p:cxnSp>
+        <p:nvCxnSpPr>
+          <p:cNvPr id="11" name="Gerade Verbindung mit Pfeil 10">
+            <a:extLst>
+              <a:ext uri="{FF2B5EF4-FFF2-40B4-BE49-F238E27FC236}">
+                <a16:creationId xmlns:a16="http://schemas.microsoft.com/office/drawing/2014/main" id="{178A4EF8-CEFB-49B2-AF18-4CE9C3FEEC6B}"/>
+              </a:ext>
+            </a:extLst>
+          </p:cNvPr>
+          <p:cNvCxnSpPr>
+            <a:cxnSpLocks/>
+            <a:stCxn id="4" idx="1"/>
+            <a:endCxn id="5" idx="0"/>
+          </p:cNvCxnSpPr>
+          <p:nvPr/>
+        </p:nvCxnSpPr>
+        <p:spPr>
+          <a:xfrm flipH="1">
+            <a:off x="2968752" y="1854960"/>
+            <a:ext cx="1981200" cy="1245586"/>
+          </a:xfrm>
+          <a:prstGeom prst="straightConnector1">
+            <a:avLst/>
+          </a:prstGeom>
+          <a:ln w="28575">
+            <a:tailEnd type="triangle"/>
+          </a:ln>
+        </p:spPr>
+        <p:style>
+          <a:lnRef idx="1">
+            <a:schemeClr val="accent1"/>
+          </a:lnRef>
+          <a:fillRef idx="0">
+            <a:schemeClr val="accent1"/>
+          </a:fillRef>
+          <a:effectRef idx="0">
+            <a:schemeClr val="accent1"/>
+          </a:effectRef>
+          <a:fontRef idx="minor">
+            <a:schemeClr val="tx1"/>
+          </a:fontRef>
+        </p:style>
+      </p:cxnSp>
+      <p:cxnSp>
+        <p:nvCxnSpPr>
+          <p:cNvPr id="13" name="Gerade Verbindung mit Pfeil 12">
+            <a:extLst>
+              <a:ext uri="{FF2B5EF4-FFF2-40B4-BE49-F238E27FC236}">
+                <a16:creationId xmlns:a16="http://schemas.microsoft.com/office/drawing/2014/main" id="{BD59FC39-28EB-4660-BC88-5226E05D6A58}"/>
+              </a:ext>
+            </a:extLst>
+          </p:cNvPr>
+          <p:cNvCxnSpPr>
+            <a:cxnSpLocks/>
+            <a:stCxn id="4" idx="3"/>
+            <a:endCxn id="7" idx="0"/>
+          </p:cNvCxnSpPr>
+          <p:nvPr/>
+        </p:nvCxnSpPr>
+        <p:spPr>
+          <a:xfrm>
+            <a:off x="6291072" y="1854960"/>
+            <a:ext cx="1981200" cy="1199137"/>
+          </a:xfrm>
+          <a:prstGeom prst="straightConnector1">
+            <a:avLst/>
+          </a:prstGeom>
+          <a:ln w="28575">
+            <a:tailEnd type="triangle"/>
+          </a:ln>
+        </p:spPr>
+        <p:style>
+          <a:lnRef idx="1">
+            <a:schemeClr val="accent1"/>
+          </a:lnRef>
+          <a:fillRef idx="0">
+            <a:schemeClr val="accent1"/>
+          </a:fillRef>
+          <a:effectRef idx="0">
+            <a:schemeClr val="accent1"/>
+          </a:effectRef>
+          <a:fontRef idx="minor">
+            <a:schemeClr val="tx1"/>
+          </a:fontRef>
+        </p:style>
+      </p:cxnSp>
+      <p:sp>
+        <p:nvSpPr>
+          <p:cNvPr id="14" name="Rechteck: abgerundete Ecken 13">
+            <a:extLst>
+              <a:ext uri="{FF2B5EF4-FFF2-40B4-BE49-F238E27FC236}">
+                <a16:creationId xmlns:a16="http://schemas.microsoft.com/office/drawing/2014/main" id="{07408CE0-1EC2-43FE-B9C4-97098F2306C8}"/>
+              </a:ext>
+            </a:extLst>
+          </p:cNvPr>
+          <p:cNvSpPr/>
+          <p:nvPr/>
+        </p:nvSpPr>
+        <p:spPr>
+          <a:xfrm>
+            <a:off x="4949952" y="4569682"/>
+            <a:ext cx="1341120" cy="540000"/>
+          </a:xfrm>
+          <a:prstGeom prst="roundRect">
+            <a:avLst/>
+          </a:prstGeom>
+          <a:solidFill>
+            <a:srgbClr val="00B0F0"/>
+          </a:solidFill>
+        </p:spPr>
+        <p:style>
+          <a:lnRef idx="2">
+            <a:schemeClr val="accent1">
+              <a:shade val="50000"/>
+            </a:schemeClr>
+          </a:lnRef>
+          <a:fillRef idx="1">
+            <a:schemeClr val="accent1"/>
+          </a:fillRef>
+          <a:effectRef idx="0">
+            <a:schemeClr val="accent1"/>
+          </a:effectRef>
+          <a:fontRef idx="minor">
+            <a:schemeClr val="lt1"/>
+          </a:fontRef>
+        </p:style>
+        <p:txBody>
+          <a:bodyPr rtlCol="0" anchor="ctr"/>
+          <a:lstStyle/>
+          <a:p>
+            <a:pPr algn="ctr"/>
+            <a:r>
+              <a:rPr lang="de-DE" b="1" dirty="0"/>
+              <a:t>Course</a:t>
+            </a:r>
+          </a:p>
+        </p:txBody>
+      </p:sp>
+      <p:cxnSp>
+        <p:nvCxnSpPr>
+          <p:cNvPr id="24" name="Gerade Verbindung mit Pfeil 23">
+            <a:extLst>
+              <a:ext uri="{FF2B5EF4-FFF2-40B4-BE49-F238E27FC236}">
+                <a16:creationId xmlns:a16="http://schemas.microsoft.com/office/drawing/2014/main" id="{DB0EF881-4C9F-446F-856E-E94783560709}"/>
+              </a:ext>
+            </a:extLst>
+          </p:cNvPr>
+          <p:cNvCxnSpPr>
+            <a:stCxn id="6" idx="2"/>
+            <a:endCxn id="14" idx="0"/>
+          </p:cNvCxnSpPr>
+          <p:nvPr/>
+        </p:nvCxnSpPr>
+        <p:spPr>
+          <a:xfrm>
+            <a:off x="5620512" y="3594097"/>
+            <a:ext cx="0" cy="975585"/>
+          </a:xfrm>
+          <a:prstGeom prst="straightConnector1">
+            <a:avLst/>
+          </a:prstGeom>
+          <a:ln w="28575">
+            <a:tailEnd type="triangle"/>
+          </a:ln>
+        </p:spPr>
+        <p:style>
+          <a:lnRef idx="1">
+            <a:schemeClr val="accent1"/>
+          </a:lnRef>
+          <a:fillRef idx="0">
+            <a:schemeClr val="accent1"/>
+          </a:fillRef>
+          <a:effectRef idx="0">
+            <a:schemeClr val="accent1"/>
+          </a:effectRef>
+          <a:fontRef idx="minor">
+            <a:schemeClr val="tx1"/>
+          </a:fontRef>
+        </p:style>
+      </p:cxnSp>
+      <p:sp>
+        <p:nvSpPr>
+          <p:cNvPr id="25" name="Rechteck: abgerundete Ecken 24">
+            <a:extLst>
+              <a:ext uri="{FF2B5EF4-FFF2-40B4-BE49-F238E27FC236}">
+                <a16:creationId xmlns:a16="http://schemas.microsoft.com/office/drawing/2014/main" id="{9BA6734D-B53A-46D8-B37A-D57DEBA6AD21}"/>
+              </a:ext>
+            </a:extLst>
+          </p:cNvPr>
+          <p:cNvSpPr/>
+          <p:nvPr/>
+        </p:nvSpPr>
+        <p:spPr>
+          <a:xfrm>
+            <a:off x="4949952" y="5810947"/>
+            <a:ext cx="1341120" cy="548640"/>
+          </a:xfrm>
+          <a:prstGeom prst="roundRect">
+            <a:avLst/>
+          </a:prstGeom>
+          <a:solidFill>
+            <a:schemeClr val="bg2">
+              <a:lumMod val="10000"/>
+            </a:schemeClr>
+          </a:solidFill>
+        </p:spPr>
+        <p:style>
+          <a:lnRef idx="2">
+            <a:schemeClr val="accent1">
+              <a:shade val="50000"/>
+            </a:schemeClr>
+          </a:lnRef>
+          <a:fillRef idx="1">
+            <a:schemeClr val="accent1"/>
+          </a:fillRef>
+          <a:effectRef idx="0">
+            <a:schemeClr val="accent1"/>
+          </a:effectRef>
+          <a:fontRef idx="minor">
+            <a:schemeClr val="lt1"/>
+          </a:fontRef>
+        </p:style>
+        <p:txBody>
+          <a:bodyPr rtlCol="0" anchor="ctr"/>
+          <a:lstStyle/>
+          <a:p>
+            <a:pPr algn="ctr"/>
+            <a:r>
+              <a:rPr lang="de-DE" dirty="0"/>
+              <a:t>RSS</a:t>
+            </a:r>
+          </a:p>
+        </p:txBody>
+      </p:sp>
+      <p:cxnSp>
+        <p:nvCxnSpPr>
+          <p:cNvPr id="29" name="Gerade Verbindung mit Pfeil 28">
+            <a:extLst>
+              <a:ext uri="{FF2B5EF4-FFF2-40B4-BE49-F238E27FC236}">
+                <a16:creationId xmlns:a16="http://schemas.microsoft.com/office/drawing/2014/main" id="{1C307476-2FCD-443D-B527-47A22C084A88}"/>
+              </a:ext>
+            </a:extLst>
+          </p:cNvPr>
+          <p:cNvCxnSpPr>
+            <a:cxnSpLocks/>
+          </p:cNvCxnSpPr>
+          <p:nvPr/>
+        </p:nvCxnSpPr>
+        <p:spPr>
+          <a:xfrm>
+            <a:off x="5620512" y="4992269"/>
+            <a:ext cx="0" cy="818678"/>
+          </a:xfrm>
+          <a:prstGeom prst="straightConnector1">
+            <a:avLst/>
+          </a:prstGeom>
+          <a:ln w="25400">
+            <a:tailEnd type="triangle"/>
+          </a:ln>
+        </p:spPr>
+        <p:style>
+          <a:lnRef idx="1">
+            <a:schemeClr val="accent1"/>
+          </a:lnRef>
+          <a:fillRef idx="0">
+            <a:schemeClr val="accent1"/>
+          </a:fillRef>
+          <a:effectRef idx="0">
+            <a:schemeClr val="accent1"/>
+          </a:effectRef>
+          <a:fontRef idx="minor">
+            <a:schemeClr val="tx1"/>
+          </a:fontRef>
+        </p:style>
+      </p:cxnSp>
+    </p:spTree>
+    <p:extLst>
+      <p:ext uri="{BB962C8B-B14F-4D97-AF65-F5344CB8AC3E}">
+        <p14:creationId xmlns:p14="http://schemas.microsoft.com/office/powerpoint/2010/main" val="1079615158"/>
+      </p:ext>
+    </p:extLst>
+  </p:cSld>
+  <p:clrMapOvr>
+    <a:masterClrMapping/>
+  </p:clrMapOvr>
+  <p:timing>
+    <p:tnLst>
+      <p:par>
+        <p:cTn id="1" dur="indefinite" restart="never" nodeType="tmRoot">
+          <p:childTnLst>
+            <p:seq concurrent="1" nextAc="seek">
+              <p:cTn id="2" dur="indefinite" nodeType="mainSeq">
+                <p:childTnLst>
+                  <p:par>
+                    <p:cTn id="3" fill="hold">
+                      <p:stCondLst>
+                        <p:cond delay="indefinite"/>
+                      </p:stCondLst>
+                      <p:childTnLst>
+                        <p:par>
+                          <p:cTn id="4" fill="hold">
+                            <p:stCondLst>
+                              <p:cond delay="0"/>
+                            </p:stCondLst>
+                            <p:childTnLst>
+                              <p:par>
+                                <p:cTn id="5" presetID="22" presetClass="entr" presetSubtype="4" fill="hold" grpId="0" nodeType="clickEffect">
+                                  <p:stCondLst>
+                                    <p:cond delay="0"/>
+                                  </p:stCondLst>
+                                  <p:childTnLst>
+                                    <p:set>
+                                      <p:cBhvr>
+                                        <p:cTn id="6" dur="1" fill="hold">
+                                          <p:stCondLst>
+                                            <p:cond delay="0"/>
+                                          </p:stCondLst>
+                                        </p:cTn>
+                                        <p:tgtEl>
+                                          <p:spTgt spid="4"/>
+                                        </p:tgtEl>
+                                        <p:attrNameLst>
+                                          <p:attrName>style.visibility</p:attrName>
+                                        </p:attrNameLst>
+                                      </p:cBhvr>
+                                      <p:to>
+                                        <p:strVal val="visible"/>
+                                      </p:to>
+                                    </p:set>
+                                    <p:animEffect transition="in" filter="wipe(down)">
+                                      <p:cBhvr>
+                                        <p:cTn id="7" dur="500"/>
+                                        <p:tgtEl>
+                                          <p:spTgt spid="4"/>
+                                        </p:tgtEl>
+                                      </p:cBhvr>
+                                    </p:animEffect>
+                                  </p:childTnLst>
+                                </p:cTn>
+                              </p:par>
+                            </p:childTnLst>
+                          </p:cTn>
+                        </p:par>
+                      </p:childTnLst>
+                    </p:cTn>
+                  </p:par>
+                  <p:par>
+                    <p:cTn id="8" fill="hold">
+                      <p:stCondLst>
+                        <p:cond delay="indefinite"/>
+                      </p:stCondLst>
+                      <p:childTnLst>
+                        <p:par>
+                          <p:cTn id="9" fill="hold">
+                            <p:stCondLst>
+                              <p:cond delay="0"/>
+                            </p:stCondLst>
+                            <p:childTnLst>
+                              <p:par>
+                                <p:cTn id="10" presetID="22" presetClass="entr" presetSubtype="4" fill="hold" nodeType="clickEffect">
+                                  <p:stCondLst>
+                                    <p:cond delay="0"/>
+                                  </p:stCondLst>
+                                  <p:childTnLst>
+                                    <p:set>
+                                      <p:cBhvr>
+                                        <p:cTn id="11" dur="1" fill="hold">
+                                          <p:stCondLst>
+                                            <p:cond delay="0"/>
+                                          </p:stCondLst>
+                                        </p:cTn>
+                                        <p:tgtEl>
+                                          <p:spTgt spid="11"/>
+                                        </p:tgtEl>
+                                        <p:attrNameLst>
+                                          <p:attrName>style.visibility</p:attrName>
+                                        </p:attrNameLst>
+                                      </p:cBhvr>
+                                      <p:to>
+                                        <p:strVal val="visible"/>
+                                      </p:to>
+                                    </p:set>
+                                    <p:animEffect transition="in" filter="wipe(down)">
+                                      <p:cBhvr>
+                                        <p:cTn id="12" dur="500"/>
+                                        <p:tgtEl>
+                                          <p:spTgt spid="11"/>
+                                        </p:tgtEl>
+                                      </p:cBhvr>
+                                    </p:animEffect>
+                                  </p:childTnLst>
+                                </p:cTn>
+                              </p:par>
+                              <p:par>
+                                <p:cTn id="13" presetID="22" presetClass="entr" presetSubtype="4" fill="hold" grpId="0" nodeType="withEffect">
+                                  <p:stCondLst>
+                                    <p:cond delay="0"/>
+                                  </p:stCondLst>
+                                  <p:childTnLst>
+                                    <p:set>
+                                      <p:cBhvr>
+                                        <p:cTn id="14" dur="1" fill="hold">
+                                          <p:stCondLst>
+                                            <p:cond delay="0"/>
+                                          </p:stCondLst>
+                                        </p:cTn>
+                                        <p:tgtEl>
+                                          <p:spTgt spid="5"/>
+                                        </p:tgtEl>
+                                        <p:attrNameLst>
+                                          <p:attrName>style.visibility</p:attrName>
+                                        </p:attrNameLst>
+                                      </p:cBhvr>
+                                      <p:to>
+                                        <p:strVal val="visible"/>
+                                      </p:to>
+                                    </p:set>
+                                    <p:animEffect transition="in" filter="wipe(down)">
+                                      <p:cBhvr>
+                                        <p:cTn id="15" dur="500"/>
+                                        <p:tgtEl>
+                                          <p:spTgt spid="5"/>
+                                        </p:tgtEl>
+                                      </p:cBhvr>
+                                    </p:animEffect>
+                                  </p:childTnLst>
+                                </p:cTn>
+                              </p:par>
+                            </p:childTnLst>
+                          </p:cTn>
+                        </p:par>
+                      </p:childTnLst>
+                    </p:cTn>
+                  </p:par>
+                  <p:par>
+                    <p:cTn id="16" fill="hold">
+                      <p:stCondLst>
+                        <p:cond delay="indefinite"/>
+                      </p:stCondLst>
+                      <p:childTnLst>
+                        <p:par>
+                          <p:cTn id="17" fill="hold">
+                            <p:stCondLst>
+                              <p:cond delay="0"/>
+                            </p:stCondLst>
+                            <p:childTnLst>
+                              <p:par>
+                                <p:cTn id="18" presetID="22" presetClass="entr" presetSubtype="4" fill="hold" grpId="0" nodeType="clickEffect">
+                                  <p:stCondLst>
+                                    <p:cond delay="0"/>
+                                  </p:stCondLst>
+                                  <p:childTnLst>
+                                    <p:set>
+                                      <p:cBhvr>
+                                        <p:cTn id="19" dur="1" fill="hold">
+                                          <p:stCondLst>
+                                            <p:cond delay="0"/>
+                                          </p:stCondLst>
+                                        </p:cTn>
+                                        <p:tgtEl>
+                                          <p:spTgt spid="6"/>
+                                        </p:tgtEl>
+                                        <p:attrNameLst>
+                                          <p:attrName>style.visibility</p:attrName>
+                                        </p:attrNameLst>
+                                      </p:cBhvr>
+                                      <p:to>
+                                        <p:strVal val="visible"/>
+                                      </p:to>
+                                    </p:set>
+                                    <p:animEffect transition="in" filter="wipe(down)">
+                                      <p:cBhvr>
+                                        <p:cTn id="20" dur="500"/>
+                                        <p:tgtEl>
+                                          <p:spTgt spid="6"/>
+                                        </p:tgtEl>
+                                      </p:cBhvr>
+                                    </p:animEffect>
+                                  </p:childTnLst>
+                                </p:cTn>
+                              </p:par>
+                              <p:par>
+                                <p:cTn id="21" presetID="22" presetClass="entr" presetSubtype="4" fill="hold" nodeType="withEffect">
+                                  <p:stCondLst>
+                                    <p:cond delay="0"/>
+                                  </p:stCondLst>
+                                  <p:childTnLst>
+                                    <p:set>
+                                      <p:cBhvr>
+                                        <p:cTn id="22" dur="1" fill="hold">
+                                          <p:stCondLst>
+                                            <p:cond delay="0"/>
+                                          </p:stCondLst>
+                                        </p:cTn>
+                                        <p:tgtEl>
+                                          <p:spTgt spid="9"/>
+                                        </p:tgtEl>
+                                        <p:attrNameLst>
+                                          <p:attrName>style.visibility</p:attrName>
+                                        </p:attrNameLst>
+                                      </p:cBhvr>
+                                      <p:to>
+                                        <p:strVal val="visible"/>
+                                      </p:to>
+                                    </p:set>
+                                    <p:animEffect transition="in" filter="wipe(down)">
+                                      <p:cBhvr>
+                                        <p:cTn id="23" dur="500"/>
+                                        <p:tgtEl>
+                                          <p:spTgt spid="9"/>
+                                        </p:tgtEl>
+                                      </p:cBhvr>
+                                    </p:animEffect>
+                                  </p:childTnLst>
+                                </p:cTn>
+                              </p:par>
+                            </p:childTnLst>
+                          </p:cTn>
+                        </p:par>
+                      </p:childTnLst>
+                    </p:cTn>
+                  </p:par>
+                  <p:par>
+                    <p:cTn id="24" fill="hold">
+                      <p:stCondLst>
+                        <p:cond delay="indefinite"/>
+                      </p:stCondLst>
+                      <p:childTnLst>
+                        <p:par>
+                          <p:cTn id="25" fill="hold">
+                            <p:stCondLst>
+                              <p:cond delay="0"/>
+                            </p:stCondLst>
+                            <p:childTnLst>
+                              <p:par>
+                                <p:cTn id="26" presetID="22" presetClass="entr" presetSubtype="4" fill="hold" grpId="0" nodeType="clickEffect">
+                                  <p:stCondLst>
+                                    <p:cond delay="0"/>
+                                  </p:stCondLst>
+                                  <p:childTnLst>
+                                    <p:set>
+                                      <p:cBhvr>
+                                        <p:cTn id="27" dur="1" fill="hold">
+                                          <p:stCondLst>
+                                            <p:cond delay="0"/>
+                                          </p:stCondLst>
+                                        </p:cTn>
+                                        <p:tgtEl>
+                                          <p:spTgt spid="7"/>
+                                        </p:tgtEl>
+                                        <p:attrNameLst>
+                                          <p:attrName>style.visibility</p:attrName>
+                                        </p:attrNameLst>
+                                      </p:cBhvr>
+                                      <p:to>
+                                        <p:strVal val="visible"/>
+                                      </p:to>
+                                    </p:set>
+                                    <p:animEffect transition="in" filter="wipe(down)">
+                                      <p:cBhvr>
+                                        <p:cTn id="28" dur="500"/>
+                                        <p:tgtEl>
+                                          <p:spTgt spid="7"/>
+                                        </p:tgtEl>
+                                      </p:cBhvr>
+                                    </p:animEffect>
+                                  </p:childTnLst>
+                                </p:cTn>
+                              </p:par>
+                              <p:par>
+                                <p:cTn id="29" presetID="22" presetClass="entr" presetSubtype="4" fill="hold" nodeType="withEffect">
+                                  <p:stCondLst>
+                                    <p:cond delay="0"/>
+                                  </p:stCondLst>
+                                  <p:childTnLst>
+                                    <p:set>
+                                      <p:cBhvr>
+                                        <p:cTn id="30" dur="1" fill="hold">
+                                          <p:stCondLst>
+                                            <p:cond delay="0"/>
+                                          </p:stCondLst>
+                                        </p:cTn>
+                                        <p:tgtEl>
+                                          <p:spTgt spid="13"/>
+                                        </p:tgtEl>
+                                        <p:attrNameLst>
+                                          <p:attrName>style.visibility</p:attrName>
+                                        </p:attrNameLst>
+                                      </p:cBhvr>
+                                      <p:to>
+                                        <p:strVal val="visible"/>
+                                      </p:to>
+                                    </p:set>
+                                    <p:animEffect transition="in" filter="wipe(down)">
+                                      <p:cBhvr>
+                                        <p:cTn id="31" dur="500"/>
+                                        <p:tgtEl>
+                                          <p:spTgt spid="13"/>
+                                        </p:tgtEl>
+                                      </p:cBhvr>
+                                    </p:animEffect>
+                                  </p:childTnLst>
+                                </p:cTn>
+                              </p:par>
+                            </p:childTnLst>
+                          </p:cTn>
+                        </p:par>
+                      </p:childTnLst>
+                    </p:cTn>
+                  </p:par>
+                  <p:par>
+                    <p:cTn id="32" fill="hold">
+                      <p:stCondLst>
+                        <p:cond delay="indefinite"/>
+                      </p:stCondLst>
+                      <p:childTnLst>
+                        <p:par>
+                          <p:cTn id="33" fill="hold">
+                            <p:stCondLst>
+                              <p:cond delay="0"/>
+                            </p:stCondLst>
+                            <p:childTnLst>
+                              <p:par>
+                                <p:cTn id="34" presetID="22" presetClass="entr" presetSubtype="4" fill="hold" nodeType="clickEffect">
+                                  <p:stCondLst>
+                                    <p:cond delay="0"/>
+                                  </p:stCondLst>
+                                  <p:childTnLst>
+                                    <p:set>
+                                      <p:cBhvr>
+                                        <p:cTn id="35" dur="1" fill="hold">
+                                          <p:stCondLst>
+                                            <p:cond delay="0"/>
+                                          </p:stCondLst>
+                                        </p:cTn>
+                                        <p:tgtEl>
+                                          <p:spTgt spid="24"/>
+                                        </p:tgtEl>
+                                        <p:attrNameLst>
+                                          <p:attrName>style.visibility</p:attrName>
+                                        </p:attrNameLst>
+                                      </p:cBhvr>
+                                      <p:to>
+                                        <p:strVal val="visible"/>
+                                      </p:to>
+                                    </p:set>
+                                    <p:animEffect transition="in" filter="wipe(down)">
+                                      <p:cBhvr>
+                                        <p:cTn id="36" dur="500"/>
+                                        <p:tgtEl>
+                                          <p:spTgt spid="24"/>
+                                        </p:tgtEl>
+                                      </p:cBhvr>
+                                    </p:animEffect>
+                                  </p:childTnLst>
+                                </p:cTn>
+                              </p:par>
+                              <p:par>
+                                <p:cTn id="37" presetID="22" presetClass="entr" presetSubtype="4" fill="hold" grpId="0" nodeType="withEffect">
+                                  <p:stCondLst>
+                                    <p:cond delay="0"/>
+                                  </p:stCondLst>
+                                  <p:childTnLst>
+                                    <p:set>
+                                      <p:cBhvr>
+                                        <p:cTn id="38" dur="1" fill="hold">
+                                          <p:stCondLst>
+                                            <p:cond delay="0"/>
+                                          </p:stCondLst>
+                                        </p:cTn>
+                                        <p:tgtEl>
+                                          <p:spTgt spid="14"/>
+                                        </p:tgtEl>
+                                        <p:attrNameLst>
+                                          <p:attrName>style.visibility</p:attrName>
+                                        </p:attrNameLst>
+                                      </p:cBhvr>
+                                      <p:to>
+                                        <p:strVal val="visible"/>
+                                      </p:to>
+                                    </p:set>
+                                    <p:animEffect transition="in" filter="wipe(down)">
+                                      <p:cBhvr>
+                                        <p:cTn id="39" dur="500"/>
+                                        <p:tgtEl>
+                                          <p:spTgt spid="14"/>
+                                        </p:tgtEl>
+                                      </p:cBhvr>
+                                    </p:animEffect>
+                                  </p:childTnLst>
+                                </p:cTn>
+                              </p:par>
+                            </p:childTnLst>
+                          </p:cTn>
+                        </p:par>
+                      </p:childTnLst>
+                    </p:cTn>
+                  </p:par>
+                  <p:par>
+                    <p:cTn id="40" fill="hold">
+                      <p:stCondLst>
+                        <p:cond delay="indefinite"/>
+                      </p:stCondLst>
+                      <p:childTnLst>
+                        <p:par>
+                          <p:cTn id="41" fill="hold">
+                            <p:stCondLst>
+                              <p:cond delay="0"/>
+                            </p:stCondLst>
+                            <p:childTnLst>
+                              <p:par>
+                                <p:cTn id="42" presetID="22" presetClass="entr" presetSubtype="4" fill="hold" grpId="0" nodeType="clickEffect">
+                                  <p:stCondLst>
+                                    <p:cond delay="0"/>
+                                  </p:stCondLst>
+                                  <p:childTnLst>
+                                    <p:set>
+                                      <p:cBhvr>
+                                        <p:cTn id="43" dur="1" fill="hold">
+                                          <p:stCondLst>
+                                            <p:cond delay="0"/>
+                                          </p:stCondLst>
+                                        </p:cTn>
+                                        <p:tgtEl>
+                                          <p:spTgt spid="25"/>
+                                        </p:tgtEl>
+                                        <p:attrNameLst>
+                                          <p:attrName>style.visibility</p:attrName>
+                                        </p:attrNameLst>
+                                      </p:cBhvr>
+                                      <p:to>
+                                        <p:strVal val="visible"/>
+                                      </p:to>
+                                    </p:set>
+                                    <p:animEffect transition="in" filter="wipe(down)">
+                                      <p:cBhvr>
+                                        <p:cTn id="44" dur="500"/>
+                                        <p:tgtEl>
+                                          <p:spTgt spid="25"/>
+                                        </p:tgtEl>
+                                      </p:cBhvr>
+                                    </p:animEffect>
+                                  </p:childTnLst>
+                                </p:cTn>
+                              </p:par>
+                              <p:par>
+                                <p:cTn id="45" presetID="22" presetClass="entr" presetSubtype="4" fill="hold" nodeType="withEffect">
+                                  <p:stCondLst>
+                                    <p:cond delay="0"/>
+                                  </p:stCondLst>
+                                  <p:childTnLst>
+                                    <p:set>
+                                      <p:cBhvr>
+                                        <p:cTn id="46" dur="1" fill="hold">
+                                          <p:stCondLst>
+                                            <p:cond delay="0"/>
+                                          </p:stCondLst>
+                                        </p:cTn>
+                                        <p:tgtEl>
+                                          <p:spTgt spid="29"/>
+                                        </p:tgtEl>
+                                        <p:attrNameLst>
+                                          <p:attrName>style.visibility</p:attrName>
+                                        </p:attrNameLst>
+                                      </p:cBhvr>
+                                      <p:to>
+                                        <p:strVal val="visible"/>
+                                      </p:to>
+                                    </p:set>
+                                    <p:animEffect transition="in" filter="wipe(down)">
+                                      <p:cBhvr>
+                                        <p:cTn id="47" dur="500"/>
+                                        <p:tgtEl>
+                                          <p:spTgt spid="29"/>
+                                        </p:tgtEl>
+                                      </p:cBhvr>
+                                    </p:animEffect>
+                                  </p:childTnLst>
+                                </p:cTn>
+                              </p:par>
+                            </p:childTnLst>
+                          </p:cTn>
+                        </p:par>
+                      </p:childTnLst>
+                    </p:cTn>
+                  </p:par>
+                </p:childTnLst>
+              </p:cTn>
+              <p:prevCondLst>
+                <p:cond evt="onPrev" delay="0">
+                  <p:tgtEl>
+                    <p:sldTgt/>
+                  </p:tgtEl>
+                </p:cond>
+              </p:prevCondLst>
+              <p:nextCondLst>
+                <p:cond evt="onNext" delay="0">
+                  <p:tgtEl>
+                    <p:sldTgt/>
+                  </p:tgtEl>
+                </p:cond>
+              </p:nextCondLst>
+            </p:seq>
+          </p:childTnLst>
+        </p:cTn>
+      </p:par>
+    </p:tnLst>
+    <p:bldLst>
+      <p:bldP spid="4" grpId="0" animBg="1"/>
+      <p:bldP spid="5" grpId="0" animBg="1"/>
+      <p:bldP spid="6" grpId="0" animBg="1"/>
+      <p:bldP spid="7" grpId="0" animBg="1"/>
+      <p:bldP spid="14" grpId="0" animBg="1"/>
+      <p:bldP spid="25" grpId="0" animBg="1"/>
+    </p:bldLst>
+  </p:timing>
+</p:sld>
+</file>
+
+<file path=ppt/slides/slide6.xml><?xml version="1.0" encoding="utf-8"?>
+<p:sld xmlns:a="http://schemas.openxmlformats.org/drawingml/2006/main" xmlns:r="http://schemas.openxmlformats.org/officeDocument/2006/relationships" xmlns:p="http://schemas.openxmlformats.org/presentationml/2006/main">
+  <p:cSld>
+    <p:spTree>
+      <p:nvGrpSpPr>
+        <p:cNvPr id="1" name=""/>
+        <p:cNvGrpSpPr/>
+        <p:nvPr/>
+      </p:nvGrpSpPr>
+      <p:grpSpPr>
+        <a:xfrm>
+          <a:off x="0" y="0"/>
+          <a:ext cx="0" cy="0"/>
+          <a:chOff x="0" y="0"/>
+          <a:chExt cx="0" cy="0"/>
+        </a:xfrm>
+      </p:grpSpPr>
+      <p:sp>
+        <p:nvSpPr>
+          <p:cNvPr id="2" name="Titel 1">
+            <a:extLst>
+              <a:ext uri="{FF2B5EF4-FFF2-40B4-BE49-F238E27FC236}">
+                <a16:creationId xmlns:a16="http://schemas.microsoft.com/office/drawing/2014/main" id="{AA694204-F6B6-4325-87C1-996265A22143}"/>
+              </a:ext>
+            </a:extLst>
+          </p:cNvPr>
+          <p:cNvSpPr>
+            <a:spLocks noGrp="1"/>
+          </p:cNvSpPr>
+          <p:nvPr>
+            <p:ph type="title"/>
+          </p:nvPr>
+        </p:nvSpPr>
+        <p:spPr/>
+        <p:txBody>
+          <a:bodyPr/>
+          <a:lstStyle/>
+          <a:p>
+            <a:r>
+              <a:rPr lang="de-DE" dirty="0"/>
+              <a:t>Modules</a:t>
+            </a:r>
+          </a:p>
+        </p:txBody>
+      </p:sp>
+      <p:sp>
+        <p:nvSpPr>
+          <p:cNvPr id="4" name="Rechteck: abgerundete Ecken 3">
+            <a:extLst>
+              <a:ext uri="{FF2B5EF4-FFF2-40B4-BE49-F238E27FC236}">
+                <a16:creationId xmlns:a16="http://schemas.microsoft.com/office/drawing/2014/main" id="{C7A24D26-EC5F-4476-9AC1-AFBD44B34CB9}"/>
+              </a:ext>
+            </a:extLst>
+          </p:cNvPr>
+          <p:cNvSpPr/>
+          <p:nvPr/>
+        </p:nvSpPr>
+        <p:spPr>
+          <a:xfrm>
+            <a:off x="4949952" y="1584960"/>
+            <a:ext cx="1341120" cy="540000"/>
+          </a:xfrm>
+          <a:prstGeom prst="roundRect">
+            <a:avLst/>
+          </a:prstGeom>
+        </p:spPr>
+        <p:style>
+          <a:lnRef idx="2">
+            <a:schemeClr val="accent1">
+              <a:shade val="50000"/>
+            </a:schemeClr>
+          </a:lnRef>
+          <a:fillRef idx="1">
+            <a:schemeClr val="accent1"/>
+          </a:fillRef>
+          <a:effectRef idx="0">
+            <a:schemeClr val="accent1"/>
+          </a:effectRef>
+          <a:fontRef idx="minor">
+            <a:schemeClr val="lt1"/>
+          </a:fontRef>
+        </p:style>
+        <p:txBody>
+          <a:bodyPr rtlCol="0" anchor="ctr"/>
+          <a:lstStyle/>
+          <a:p>
+            <a:pPr algn="ctr"/>
+            <a:r>
+              <a:rPr lang="de-DE" b="1" dirty="0"/>
+              <a:t>App</a:t>
+            </a:r>
+          </a:p>
+        </p:txBody>
+      </p:sp>
+      <p:sp>
+        <p:nvSpPr>
+          <p:cNvPr id="5" name="Rechteck: abgerundete Ecken 4">
+            <a:extLst>
+              <a:ext uri="{FF2B5EF4-FFF2-40B4-BE49-F238E27FC236}">
+                <a16:creationId xmlns:a16="http://schemas.microsoft.com/office/drawing/2014/main" id="{D7336382-4C87-4F0A-9F0B-8A04FEC29448}"/>
+              </a:ext>
+            </a:extLst>
+          </p:cNvPr>
+          <p:cNvSpPr/>
+          <p:nvPr/>
+        </p:nvSpPr>
+        <p:spPr>
+          <a:xfrm>
+            <a:off x="2298192" y="3100546"/>
+            <a:ext cx="1341120" cy="540000"/>
+          </a:xfrm>
+          <a:prstGeom prst="roundRect">
+            <a:avLst/>
+          </a:prstGeom>
+          <a:solidFill>
+            <a:schemeClr val="bg2">
+              <a:lumMod val="50000"/>
+            </a:schemeClr>
+          </a:solidFill>
+        </p:spPr>
+        <p:style>
+          <a:lnRef idx="2">
+            <a:schemeClr val="accent1">
+              <a:shade val="50000"/>
+            </a:schemeClr>
+          </a:lnRef>
+          <a:fillRef idx="1">
+            <a:schemeClr val="accent1"/>
+          </a:fillRef>
+          <a:effectRef idx="0">
+            <a:schemeClr val="accent1"/>
+          </a:effectRef>
+          <a:fontRef idx="minor">
+            <a:schemeClr val="lt1"/>
+          </a:fontRef>
+        </p:style>
+        <p:txBody>
+          <a:bodyPr rtlCol="0" anchor="ctr"/>
+          <a:lstStyle/>
+          <a:p>
+            <a:pPr algn="ctr"/>
+            <a:r>
+              <a:rPr lang="de-DE" b="1" dirty="0"/>
+              <a:t>Sidebar</a:t>
+            </a:r>
+          </a:p>
+        </p:txBody>
+      </p:sp>
+      <p:sp>
+        <p:nvSpPr>
+          <p:cNvPr id="6" name="Rechteck: abgerundete Ecken 5">
+            <a:extLst>
+              <a:ext uri="{FF2B5EF4-FFF2-40B4-BE49-F238E27FC236}">
+                <a16:creationId xmlns:a16="http://schemas.microsoft.com/office/drawing/2014/main" id="{0AD6926F-A4A7-4483-A433-B3919ABD3C6F}"/>
+              </a:ext>
+            </a:extLst>
+          </p:cNvPr>
+          <p:cNvSpPr/>
+          <p:nvPr/>
+        </p:nvSpPr>
+        <p:spPr>
+          <a:xfrm>
+            <a:off x="4949952" y="3054097"/>
+            <a:ext cx="1341120" cy="540000"/>
+          </a:xfrm>
+          <a:prstGeom prst="roundRect">
+            <a:avLst/>
+          </a:prstGeom>
+          <a:solidFill>
+            <a:schemeClr val="bg2">
+              <a:lumMod val="50000"/>
+            </a:schemeClr>
+          </a:solidFill>
+        </p:spPr>
+        <p:style>
+          <a:lnRef idx="2">
+            <a:schemeClr val="accent1">
+              <a:shade val="50000"/>
+            </a:schemeClr>
+          </a:lnRef>
+          <a:fillRef idx="1">
+            <a:schemeClr val="accent1"/>
+          </a:fillRef>
+          <a:effectRef idx="0">
+            <a:schemeClr val="accent1"/>
+          </a:effectRef>
+          <a:fontRef idx="minor">
+            <a:schemeClr val="lt1"/>
+          </a:fontRef>
+        </p:style>
+        <p:txBody>
+          <a:bodyPr rtlCol="0" anchor="ctr"/>
+          <a:lstStyle/>
+          <a:p>
+            <a:pPr algn="ctr"/>
+            <a:r>
+              <a:rPr lang="de-DE" b="1" dirty="0"/>
+              <a:t>Courses</a:t>
+            </a:r>
+          </a:p>
+        </p:txBody>
+      </p:sp>
+      <p:sp>
+        <p:nvSpPr>
+          <p:cNvPr id="7" name="Rechteck: abgerundete Ecken 6">
+            <a:extLst>
+              <a:ext uri="{FF2B5EF4-FFF2-40B4-BE49-F238E27FC236}">
+                <a16:creationId xmlns:a16="http://schemas.microsoft.com/office/drawing/2014/main" id="{69412992-EBCD-4C6D-8E91-6AC65137F9DD}"/>
+              </a:ext>
+            </a:extLst>
+          </p:cNvPr>
+          <p:cNvSpPr/>
+          <p:nvPr/>
+        </p:nvSpPr>
+        <p:spPr>
+          <a:xfrm>
+            <a:off x="7601712" y="3054097"/>
+            <a:ext cx="1341120" cy="540000"/>
+          </a:xfrm>
+          <a:prstGeom prst="roundRect">
+            <a:avLst/>
+          </a:prstGeom>
+          <a:solidFill>
+            <a:schemeClr val="bg2">
+              <a:lumMod val="50000"/>
+            </a:schemeClr>
+          </a:solidFill>
+        </p:spPr>
+        <p:style>
+          <a:lnRef idx="2">
+            <a:schemeClr val="accent1">
+              <a:shade val="50000"/>
+            </a:schemeClr>
+          </a:lnRef>
+          <a:fillRef idx="1">
+            <a:schemeClr val="accent1"/>
+          </a:fillRef>
+          <a:effectRef idx="0">
+            <a:schemeClr val="accent1"/>
+          </a:effectRef>
+          <a:fontRef idx="minor">
+            <a:schemeClr val="lt1"/>
+          </a:fontRef>
+        </p:style>
+        <p:txBody>
+          <a:bodyPr rtlCol="0" anchor="ctr"/>
+          <a:lstStyle/>
+          <a:p>
+            <a:pPr algn="ctr"/>
+            <a:r>
+              <a:rPr lang="de-DE" b="1" dirty="0" err="1"/>
+              <a:t>Navbar</a:t>
+            </a:r>
+            <a:endParaRPr lang="de-DE" b="1" dirty="0"/>
+          </a:p>
+        </p:txBody>
+      </p:sp>
+      <p:cxnSp>
+        <p:nvCxnSpPr>
+          <p:cNvPr id="9" name="Gerade Verbindung mit Pfeil 8">
+            <a:extLst>
+              <a:ext uri="{FF2B5EF4-FFF2-40B4-BE49-F238E27FC236}">
+                <a16:creationId xmlns:a16="http://schemas.microsoft.com/office/drawing/2014/main" id="{27774663-4CF1-4B9B-BC88-807EDA68BE8F}"/>
+              </a:ext>
+            </a:extLst>
+          </p:cNvPr>
+          <p:cNvCxnSpPr>
+            <a:cxnSpLocks/>
+            <a:stCxn id="4" idx="2"/>
+            <a:endCxn id="6" idx="0"/>
+          </p:cNvCxnSpPr>
+          <p:nvPr/>
+        </p:nvCxnSpPr>
+        <p:spPr>
+          <a:xfrm>
+            <a:off x="5620512" y="2124960"/>
+            <a:ext cx="0" cy="929137"/>
+          </a:xfrm>
+          <a:prstGeom prst="straightConnector1">
+            <a:avLst/>
+          </a:prstGeom>
+          <a:ln w="28575">
+            <a:tailEnd type="triangle"/>
+          </a:ln>
+        </p:spPr>
+        <p:style>
+          <a:lnRef idx="1">
+            <a:schemeClr val="accent1"/>
+          </a:lnRef>
+          <a:fillRef idx="0">
+            <a:schemeClr val="accent1"/>
+          </a:fillRef>
+          <a:effectRef idx="0">
+            <a:schemeClr val="accent1"/>
+          </a:effectRef>
+          <a:fontRef idx="minor">
+            <a:schemeClr val="tx1"/>
+          </a:fontRef>
+        </p:style>
+      </p:cxnSp>
+      <p:cxnSp>
+        <p:nvCxnSpPr>
+          <p:cNvPr id="11" name="Gerade Verbindung mit Pfeil 10">
+            <a:extLst>
+              <a:ext uri="{FF2B5EF4-FFF2-40B4-BE49-F238E27FC236}">
+                <a16:creationId xmlns:a16="http://schemas.microsoft.com/office/drawing/2014/main" id="{178A4EF8-CEFB-49B2-AF18-4CE9C3FEEC6B}"/>
+              </a:ext>
+            </a:extLst>
+          </p:cNvPr>
+          <p:cNvCxnSpPr>
+            <a:cxnSpLocks/>
+            <a:stCxn id="4" idx="1"/>
+            <a:endCxn id="5" idx="0"/>
+          </p:cNvCxnSpPr>
+          <p:nvPr/>
+        </p:nvCxnSpPr>
+        <p:spPr>
+          <a:xfrm flipH="1">
+            <a:off x="2968752" y="1854960"/>
+            <a:ext cx="1981200" cy="1245586"/>
+          </a:xfrm>
+          <a:prstGeom prst="straightConnector1">
+            <a:avLst/>
+          </a:prstGeom>
+          <a:ln w="28575">
+            <a:tailEnd type="triangle"/>
+          </a:ln>
+        </p:spPr>
+        <p:style>
+          <a:lnRef idx="1">
+            <a:schemeClr val="accent1"/>
+          </a:lnRef>
+          <a:fillRef idx="0">
+            <a:schemeClr val="accent1"/>
+          </a:fillRef>
+          <a:effectRef idx="0">
+            <a:schemeClr val="accent1"/>
+          </a:effectRef>
+          <a:fontRef idx="minor">
+            <a:schemeClr val="tx1"/>
+          </a:fontRef>
+        </p:style>
+      </p:cxnSp>
+      <p:cxnSp>
+        <p:nvCxnSpPr>
+          <p:cNvPr id="13" name="Gerade Verbindung mit Pfeil 12">
+            <a:extLst>
+              <a:ext uri="{FF2B5EF4-FFF2-40B4-BE49-F238E27FC236}">
+                <a16:creationId xmlns:a16="http://schemas.microsoft.com/office/drawing/2014/main" id="{BD59FC39-28EB-4660-BC88-5226E05D6A58}"/>
+              </a:ext>
+            </a:extLst>
+          </p:cNvPr>
+          <p:cNvCxnSpPr>
+            <a:cxnSpLocks/>
+            <a:stCxn id="4" idx="3"/>
+            <a:endCxn id="7" idx="0"/>
+          </p:cNvCxnSpPr>
+          <p:nvPr/>
+        </p:nvCxnSpPr>
+        <p:spPr>
+          <a:xfrm>
+            <a:off x="6291072" y="1854960"/>
+            <a:ext cx="1981200" cy="1199137"/>
+          </a:xfrm>
+          <a:prstGeom prst="straightConnector1">
+            <a:avLst/>
+          </a:prstGeom>
+          <a:ln w="28575">
+            <a:tailEnd type="triangle"/>
+          </a:ln>
+        </p:spPr>
+        <p:style>
+          <a:lnRef idx="1">
+            <a:schemeClr val="accent1"/>
+          </a:lnRef>
+          <a:fillRef idx="0">
+            <a:schemeClr val="accent1"/>
+          </a:fillRef>
+          <a:effectRef idx="0">
+            <a:schemeClr val="accent1"/>
+          </a:effectRef>
+          <a:fontRef idx="minor">
+            <a:schemeClr val="tx1"/>
+          </a:fontRef>
+        </p:style>
+      </p:cxnSp>
+      <p:sp>
+        <p:nvSpPr>
+          <p:cNvPr id="14" name="Rechteck: abgerundete Ecken 13">
+            <a:extLst>
+              <a:ext uri="{FF2B5EF4-FFF2-40B4-BE49-F238E27FC236}">
+                <a16:creationId xmlns:a16="http://schemas.microsoft.com/office/drawing/2014/main" id="{07408CE0-1EC2-43FE-B9C4-97098F2306C8}"/>
+              </a:ext>
+            </a:extLst>
+          </p:cNvPr>
+          <p:cNvSpPr/>
+          <p:nvPr/>
+        </p:nvSpPr>
+        <p:spPr>
+          <a:xfrm>
+            <a:off x="4949952" y="4569682"/>
+            <a:ext cx="1341120" cy="540000"/>
+          </a:xfrm>
+          <a:prstGeom prst="roundRect">
+            <a:avLst/>
+          </a:prstGeom>
+          <a:solidFill>
+            <a:srgbClr val="00B0F0"/>
+          </a:solidFill>
+        </p:spPr>
+        <p:style>
+          <a:lnRef idx="2">
+            <a:schemeClr val="accent1">
+              <a:shade val="50000"/>
+            </a:schemeClr>
+          </a:lnRef>
+          <a:fillRef idx="1">
+            <a:schemeClr val="accent1"/>
+          </a:fillRef>
+          <a:effectRef idx="0">
+            <a:schemeClr val="accent1"/>
+          </a:effectRef>
+          <a:fontRef idx="minor">
+            <a:schemeClr val="lt1"/>
+          </a:fontRef>
+        </p:style>
+        <p:txBody>
+          <a:bodyPr rtlCol="0" anchor="ctr"/>
+          <a:lstStyle/>
+          <a:p>
+            <a:pPr algn="ctr"/>
+            <a:r>
+              <a:rPr lang="de-DE" b="1" dirty="0"/>
+              <a:t>Course</a:t>
+            </a:r>
+          </a:p>
+        </p:txBody>
+      </p:sp>
+      <p:cxnSp>
+        <p:nvCxnSpPr>
+          <p:cNvPr id="24" name="Gerade Verbindung mit Pfeil 23">
+            <a:extLst>
+              <a:ext uri="{FF2B5EF4-FFF2-40B4-BE49-F238E27FC236}">
+                <a16:creationId xmlns:a16="http://schemas.microsoft.com/office/drawing/2014/main" id="{DB0EF881-4C9F-446F-856E-E94783560709}"/>
+              </a:ext>
+            </a:extLst>
+          </p:cNvPr>
+          <p:cNvCxnSpPr>
+            <a:stCxn id="6" idx="2"/>
+            <a:endCxn id="14" idx="0"/>
+          </p:cNvCxnSpPr>
+          <p:nvPr/>
+        </p:nvCxnSpPr>
+        <p:spPr>
+          <a:xfrm>
+            <a:off x="5620512" y="3594097"/>
+            <a:ext cx="0" cy="975585"/>
+          </a:xfrm>
+          <a:prstGeom prst="straightConnector1">
+            <a:avLst/>
+          </a:prstGeom>
+          <a:ln w="28575">
+            <a:tailEnd type="triangle"/>
+          </a:ln>
+        </p:spPr>
+        <p:style>
+          <a:lnRef idx="1">
+            <a:schemeClr val="accent1"/>
+          </a:lnRef>
+          <a:fillRef idx="0">
+            <a:schemeClr val="accent1"/>
+          </a:fillRef>
+          <a:effectRef idx="0">
+            <a:schemeClr val="accent1"/>
+          </a:effectRef>
+          <a:fontRef idx="minor">
+            <a:schemeClr val="tx1"/>
+          </a:fontRef>
+        </p:style>
+      </p:cxnSp>
+      <p:sp>
+        <p:nvSpPr>
+          <p:cNvPr id="25" name="Rechteck: abgerundete Ecken 24">
+            <a:extLst>
+              <a:ext uri="{FF2B5EF4-FFF2-40B4-BE49-F238E27FC236}">
+                <a16:creationId xmlns:a16="http://schemas.microsoft.com/office/drawing/2014/main" id="{9BA6734D-B53A-46D8-B37A-D57DEBA6AD21}"/>
+              </a:ext>
+            </a:extLst>
+          </p:cNvPr>
+          <p:cNvSpPr/>
+          <p:nvPr/>
+        </p:nvSpPr>
+        <p:spPr>
+          <a:xfrm>
+            <a:off x="4949952" y="5810947"/>
+            <a:ext cx="1341120" cy="548640"/>
+          </a:xfrm>
+          <a:prstGeom prst="roundRect">
+            <a:avLst/>
+          </a:prstGeom>
+          <a:solidFill>
+            <a:schemeClr val="bg2">
+              <a:lumMod val="10000"/>
+            </a:schemeClr>
+          </a:solidFill>
+        </p:spPr>
+        <p:style>
+          <a:lnRef idx="2">
+            <a:schemeClr val="accent1">
+              <a:shade val="50000"/>
+            </a:schemeClr>
+          </a:lnRef>
+          <a:fillRef idx="1">
+            <a:schemeClr val="accent1"/>
+          </a:fillRef>
+          <a:effectRef idx="0">
+            <a:schemeClr val="accent1"/>
+          </a:effectRef>
+          <a:fontRef idx="minor">
+            <a:schemeClr val="lt1"/>
+          </a:fontRef>
+        </p:style>
+        <p:txBody>
+          <a:bodyPr rtlCol="0" anchor="ctr"/>
+          <a:lstStyle/>
+          <a:p>
+            <a:pPr algn="ctr"/>
+            <a:r>
+              <a:rPr lang="de-DE" dirty="0"/>
+              <a:t>RSS</a:t>
+            </a:r>
+          </a:p>
+        </p:txBody>
+      </p:sp>
+      <p:cxnSp>
+        <p:nvCxnSpPr>
+          <p:cNvPr id="29" name="Gerade Verbindung mit Pfeil 28">
+            <a:extLst>
+              <a:ext uri="{FF2B5EF4-FFF2-40B4-BE49-F238E27FC236}">
+                <a16:creationId xmlns:a16="http://schemas.microsoft.com/office/drawing/2014/main" id="{1C307476-2FCD-443D-B527-47A22C084A88}"/>
+              </a:ext>
+            </a:extLst>
+          </p:cNvPr>
+          <p:cNvCxnSpPr>
+            <a:cxnSpLocks/>
+          </p:cNvCxnSpPr>
+          <p:nvPr/>
+        </p:nvCxnSpPr>
+        <p:spPr>
+          <a:xfrm>
+            <a:off x="5620512" y="4992269"/>
+            <a:ext cx="0" cy="818678"/>
+          </a:xfrm>
+          <a:prstGeom prst="straightConnector1">
+            <a:avLst/>
+          </a:prstGeom>
+          <a:ln w="25400">
+            <a:tailEnd type="triangle"/>
+          </a:ln>
+        </p:spPr>
+        <p:style>
+          <a:lnRef idx="1">
+            <a:schemeClr val="accent1"/>
+          </a:lnRef>
+          <a:fillRef idx="0">
+            <a:schemeClr val="accent1"/>
+          </a:fillRef>
+          <a:effectRef idx="0">
+            <a:schemeClr val="accent1"/>
+          </a:effectRef>
+          <a:fontRef idx="minor">
+            <a:schemeClr val="tx1"/>
+          </a:fontRef>
+        </p:style>
+      </p:cxnSp>
+      <p:sp>
+        <p:nvSpPr>
+          <p:cNvPr id="3" name="Ellipse 2">
+            <a:extLst>
+              <a:ext uri="{FF2B5EF4-FFF2-40B4-BE49-F238E27FC236}">
+                <a16:creationId xmlns:a16="http://schemas.microsoft.com/office/drawing/2014/main" id="{E477B71F-D5E1-40ED-84E0-91468892941D}"/>
+              </a:ext>
+            </a:extLst>
+          </p:cNvPr>
+          <p:cNvSpPr/>
+          <p:nvPr/>
+        </p:nvSpPr>
+        <p:spPr>
+          <a:xfrm>
+            <a:off x="4541520" y="1341120"/>
+            <a:ext cx="2087880" cy="986467"/>
+          </a:xfrm>
+          <a:prstGeom prst="ellipse">
+            <a:avLst/>
+          </a:prstGeom>
+          <a:noFill/>
+          <a:ln w="50800"/>
+        </p:spPr>
+        <p:style>
+          <a:lnRef idx="2">
+            <a:schemeClr val="accent1">
+              <a:shade val="50000"/>
+            </a:schemeClr>
+          </a:lnRef>
+          <a:fillRef idx="1">
+            <a:schemeClr val="accent1"/>
+          </a:fillRef>
+          <a:effectRef idx="0">
+            <a:schemeClr val="accent1"/>
+          </a:effectRef>
+          <a:fontRef idx="minor">
+            <a:schemeClr val="lt1"/>
+          </a:fontRef>
+        </p:style>
+        <p:txBody>
+          <a:bodyPr rtlCol="0" anchor="ctr"/>
+          <a:lstStyle/>
+          <a:p>
+            <a:pPr algn="ctr"/>
+            <a:endParaRPr lang="de-DE"/>
+          </a:p>
+        </p:txBody>
+      </p:sp>
+      <p:sp>
+        <p:nvSpPr>
+          <p:cNvPr id="8" name="Ellipse 7">
+            <a:extLst>
+              <a:ext uri="{FF2B5EF4-FFF2-40B4-BE49-F238E27FC236}">
+                <a16:creationId xmlns:a16="http://schemas.microsoft.com/office/drawing/2014/main" id="{AD6ABF12-818C-4795-822F-D09B87491168}"/>
+              </a:ext>
+            </a:extLst>
+          </p:cNvPr>
+          <p:cNvSpPr/>
+          <p:nvPr/>
+        </p:nvSpPr>
+        <p:spPr>
+          <a:xfrm>
+            <a:off x="4369372" y="2571427"/>
+            <a:ext cx="2561780" cy="4164653"/>
+          </a:xfrm>
+          <a:prstGeom prst="ellipse">
+            <a:avLst/>
+          </a:prstGeom>
+          <a:noFill/>
+          <a:ln w="50800">
+            <a:solidFill>
+              <a:schemeClr val="tx1">
+                <a:lumMod val="95000"/>
+                <a:lumOff val="5000"/>
+              </a:schemeClr>
+            </a:solidFill>
+          </a:ln>
+        </p:spPr>
+        <p:style>
+          <a:lnRef idx="2">
+            <a:schemeClr val="accent1">
+              <a:shade val="50000"/>
+            </a:schemeClr>
+          </a:lnRef>
+          <a:fillRef idx="1">
+            <a:schemeClr val="accent1"/>
+          </a:fillRef>
+          <a:effectRef idx="0">
+            <a:schemeClr val="accent1"/>
+          </a:effectRef>
+          <a:fontRef idx="minor">
+            <a:schemeClr val="lt1"/>
+          </a:fontRef>
+        </p:style>
+        <p:txBody>
+          <a:bodyPr rtlCol="0" anchor="ctr"/>
+          <a:lstStyle/>
+          <a:p>
+            <a:pPr algn="ctr"/>
+            <a:endParaRPr lang="de-DE"/>
+          </a:p>
+        </p:txBody>
+      </p:sp>
+      <p:sp>
+        <p:nvSpPr>
+          <p:cNvPr id="10" name="Ellipse 9">
+            <a:extLst>
+              <a:ext uri="{FF2B5EF4-FFF2-40B4-BE49-F238E27FC236}">
+                <a16:creationId xmlns:a16="http://schemas.microsoft.com/office/drawing/2014/main" id="{D43ACA84-8C6E-4106-A515-D35462A56CC9}"/>
+              </a:ext>
+            </a:extLst>
+          </p:cNvPr>
+          <p:cNvSpPr/>
+          <p:nvPr/>
+        </p:nvSpPr>
+        <p:spPr>
+          <a:xfrm>
+            <a:off x="8672831" y="2514097"/>
+            <a:ext cx="540000" cy="540000"/>
+          </a:xfrm>
+          <a:prstGeom prst="ellipse">
+            <a:avLst/>
+          </a:prstGeom>
+        </p:spPr>
+        <p:style>
+          <a:lnRef idx="2">
+            <a:schemeClr val="accent1">
+              <a:shade val="50000"/>
+            </a:schemeClr>
+          </a:lnRef>
+          <a:fillRef idx="1">
+            <a:schemeClr val="accent1"/>
+          </a:fillRef>
+          <a:effectRef idx="0">
+            <a:schemeClr val="accent1"/>
+          </a:effectRef>
+          <a:fontRef idx="minor">
+            <a:schemeClr val="lt1"/>
+          </a:fontRef>
+        </p:style>
+        <p:txBody>
+          <a:bodyPr rtlCol="0" anchor="ctr"/>
+          <a:lstStyle/>
+          <a:p>
+            <a:pPr algn="ctr"/>
+            <a:r>
+              <a:rPr lang="de-DE" dirty="0"/>
+              <a:t>3</a:t>
+            </a:r>
+          </a:p>
+        </p:txBody>
+      </p:sp>
+      <p:sp>
+        <p:nvSpPr>
+          <p:cNvPr id="17" name="Ellipse 16">
+            <a:extLst>
+              <a:ext uri="{FF2B5EF4-FFF2-40B4-BE49-F238E27FC236}">
+                <a16:creationId xmlns:a16="http://schemas.microsoft.com/office/drawing/2014/main" id="{261DB168-152A-46B9-B3F0-5157E1E2D319}"/>
+              </a:ext>
+            </a:extLst>
+          </p:cNvPr>
+          <p:cNvSpPr/>
+          <p:nvPr/>
+        </p:nvSpPr>
+        <p:spPr>
+          <a:xfrm>
+            <a:off x="6282432" y="2408219"/>
+            <a:ext cx="540000" cy="540000"/>
+          </a:xfrm>
+          <a:prstGeom prst="ellipse">
+            <a:avLst/>
+          </a:prstGeom>
+        </p:spPr>
+        <p:style>
+          <a:lnRef idx="2">
+            <a:schemeClr val="accent1">
+              <a:shade val="50000"/>
+            </a:schemeClr>
+          </a:lnRef>
+          <a:fillRef idx="1">
+            <a:schemeClr val="accent1"/>
+          </a:fillRef>
+          <a:effectRef idx="0">
+            <a:schemeClr val="accent1"/>
+          </a:effectRef>
+          <a:fontRef idx="minor">
+            <a:schemeClr val="lt1"/>
+          </a:fontRef>
+        </p:style>
+        <p:txBody>
+          <a:bodyPr rtlCol="0" anchor="ctr"/>
+          <a:lstStyle/>
+          <a:p>
+            <a:pPr algn="ctr"/>
+            <a:r>
+              <a:rPr lang="de-DE" dirty="0"/>
+              <a:t>2</a:t>
+            </a:r>
+          </a:p>
+        </p:txBody>
+      </p:sp>
+      <p:sp>
+        <p:nvSpPr>
+          <p:cNvPr id="18" name="Ellipse 17">
+            <a:extLst>
+              <a:ext uri="{FF2B5EF4-FFF2-40B4-BE49-F238E27FC236}">
+                <a16:creationId xmlns:a16="http://schemas.microsoft.com/office/drawing/2014/main" id="{9DC316F3-AD3D-4742-A825-FEF7EE3A4644}"/>
+              </a:ext>
+            </a:extLst>
+          </p:cNvPr>
+          <p:cNvSpPr/>
+          <p:nvPr/>
+        </p:nvSpPr>
+        <p:spPr>
+          <a:xfrm>
+            <a:off x="6123432" y="931695"/>
+            <a:ext cx="540000" cy="540000"/>
+          </a:xfrm>
+          <a:prstGeom prst="ellipse">
+            <a:avLst/>
+          </a:prstGeom>
+        </p:spPr>
+        <p:style>
+          <a:lnRef idx="2">
+            <a:schemeClr val="accent1">
+              <a:shade val="50000"/>
+            </a:schemeClr>
+          </a:lnRef>
+          <a:fillRef idx="1">
+            <a:schemeClr val="accent1"/>
+          </a:fillRef>
+          <a:effectRef idx="0">
+            <a:schemeClr val="accent1"/>
+          </a:effectRef>
+          <a:fontRef idx="minor">
+            <a:schemeClr val="lt1"/>
+          </a:fontRef>
+        </p:style>
+        <p:txBody>
+          <a:bodyPr rtlCol="0" anchor="ctr"/>
+          <a:lstStyle/>
+          <a:p>
+            <a:pPr algn="ctr"/>
+            <a:r>
+              <a:rPr lang="de-DE" dirty="0"/>
+              <a:t>1</a:t>
+            </a:r>
+          </a:p>
+        </p:txBody>
+      </p:sp>
+      <p:sp>
+        <p:nvSpPr>
+          <p:cNvPr id="19" name="Ellipse 18">
+            <a:extLst>
+              <a:ext uri="{FF2B5EF4-FFF2-40B4-BE49-F238E27FC236}">
+                <a16:creationId xmlns:a16="http://schemas.microsoft.com/office/drawing/2014/main" id="{02740A34-6633-4EB2-844E-CF6C935354EA}"/>
+              </a:ext>
+            </a:extLst>
+          </p:cNvPr>
+          <p:cNvSpPr/>
+          <p:nvPr/>
+        </p:nvSpPr>
+        <p:spPr>
+          <a:xfrm>
+            <a:off x="3428813" y="2595850"/>
+            <a:ext cx="540000" cy="540000"/>
+          </a:xfrm>
+          <a:prstGeom prst="ellipse">
+            <a:avLst/>
+          </a:prstGeom>
+        </p:spPr>
+        <p:style>
+          <a:lnRef idx="2">
+            <a:schemeClr val="accent1">
+              <a:shade val="50000"/>
+            </a:schemeClr>
+          </a:lnRef>
+          <a:fillRef idx="1">
+            <a:schemeClr val="accent1"/>
+          </a:fillRef>
+          <a:effectRef idx="0">
+            <a:schemeClr val="accent1"/>
+          </a:effectRef>
+          <a:fontRef idx="minor">
+            <a:schemeClr val="lt1"/>
+          </a:fontRef>
+        </p:style>
+        <p:txBody>
+          <a:bodyPr rtlCol="0" anchor="ctr"/>
+          <a:lstStyle/>
+          <a:p>
+            <a:pPr algn="ctr"/>
+            <a:r>
+              <a:rPr lang="de-DE" dirty="0"/>
+              <a:t>3</a:t>
+            </a:r>
+          </a:p>
+        </p:txBody>
+      </p:sp>
+    </p:spTree>
+    <p:extLst>
+      <p:ext uri="{BB962C8B-B14F-4D97-AF65-F5344CB8AC3E}">
+        <p14:creationId xmlns:p14="http://schemas.microsoft.com/office/powerpoint/2010/main" val="3380588311"/>
+      </p:ext>
+    </p:extLst>
+  </p:cSld>
+  <p:clrMapOvr>
+    <a:masterClrMapping/>
+  </p:clrMapOvr>
+</p:sld>
+</file>
+
+<file path=ppt/slides/slide7.xml><?xml version="1.0" encoding="utf-8"?>
+<p:sld xmlns:a="http://schemas.openxmlformats.org/drawingml/2006/main" xmlns:r="http://schemas.openxmlformats.org/officeDocument/2006/relationships" xmlns:p="http://schemas.openxmlformats.org/presentationml/2006/main">
+  <p:cSld>
+    <p:spTree>
+      <p:nvGrpSpPr>
+        <p:cNvPr id="1" name=""/>
+        <p:cNvGrpSpPr/>
+        <p:nvPr/>
+      </p:nvGrpSpPr>
+      <p:grpSpPr>
+        <a:xfrm>
+          <a:off x="0" y="0"/>
+          <a:ext cx="0" cy="0"/>
+          <a:chOff x="0" y="0"/>
+          <a:chExt cx="0" cy="0"/>
+        </a:xfrm>
+      </p:grpSpPr>
+      <p:sp>
+        <p:nvSpPr>
+          <p:cNvPr id="2" name="Titel 1">
+            <a:extLst>
+              <a:ext uri="{FF2B5EF4-FFF2-40B4-BE49-F238E27FC236}">
                 <a16:creationId xmlns:a16="http://schemas.microsoft.com/office/drawing/2014/main" id="{26238925-8E86-4F2A-9E32-4EE2FC102328}"/>
               </a:ext>
             </a:extLst>
@@ -14392,7 +16731,7 @@
 </p:sld>
 </file>
 
-<file path=ppt/slides/slide6.xml><?xml version="1.0" encoding="utf-8"?>
+<file path=ppt/slides/slide8.xml><?xml version="1.0" encoding="utf-8"?>
 <p:sld xmlns:a="http://schemas.openxmlformats.org/drawingml/2006/main" xmlns:r="http://schemas.openxmlformats.org/officeDocument/2006/relationships" xmlns:p="http://schemas.openxmlformats.org/presentationml/2006/main">
   <p:cSld>
     <p:spTree>
@@ -14589,7 +16928,7 @@
 </p:sld>
 </file>
 
-<file path=ppt/slides/slide7.xml><?xml version="1.0" encoding="utf-8"?>
+<file path=ppt/slides/slide9.xml><?xml version="1.0" encoding="utf-8"?>
 <p:sld xmlns:a="http://schemas.openxmlformats.org/drawingml/2006/main" xmlns:r="http://schemas.openxmlformats.org/officeDocument/2006/relationships" xmlns:p="http://schemas.openxmlformats.org/presentationml/2006/main">
   <p:cSld>
     <p:spTree>

</xml_diff>